<commit_message>
add confusion matrix application and grid search in param tuning
</commit_message>
<xml_diff>
--- a/01_MLIntroduction/01_MLIntroduction.pptx
+++ b/01_MLIntroduction/01_MLIntroduction.pptx
@@ -5,10 +5,10 @@
     <p:sldMasterId id="2147483664" r:id="rId1"/>
   </p:sldMasterIdLst>
   <p:notesMasterIdLst>
-    <p:notesMasterId r:id="rId21"/>
+    <p:notesMasterId r:id="rId24"/>
   </p:notesMasterIdLst>
   <p:handoutMasterIdLst>
-    <p:handoutMasterId r:id="rId22"/>
+    <p:handoutMasterId r:id="rId25"/>
   </p:handoutMasterIdLst>
   <p:sldIdLst>
     <p:sldId id="264" r:id="rId2"/>
@@ -22,14 +22,17 @@
     <p:sldId id="305" r:id="rId10"/>
     <p:sldId id="298" r:id="rId11"/>
     <p:sldId id="299" r:id="rId12"/>
-    <p:sldId id="300" r:id="rId13"/>
-    <p:sldId id="301" r:id="rId14"/>
-    <p:sldId id="303" r:id="rId15"/>
-    <p:sldId id="302" r:id="rId16"/>
-    <p:sldId id="306" r:id="rId17"/>
-    <p:sldId id="307" r:id="rId18"/>
-    <p:sldId id="308" r:id="rId19"/>
-    <p:sldId id="260" r:id="rId20"/>
+    <p:sldId id="309" r:id="rId13"/>
+    <p:sldId id="310" r:id="rId14"/>
+    <p:sldId id="300" r:id="rId15"/>
+    <p:sldId id="301" r:id="rId16"/>
+    <p:sldId id="303" r:id="rId17"/>
+    <p:sldId id="302" r:id="rId18"/>
+    <p:sldId id="306" r:id="rId19"/>
+    <p:sldId id="307" r:id="rId20"/>
+    <p:sldId id="311" r:id="rId21"/>
+    <p:sldId id="308" r:id="rId22"/>
+    <p:sldId id="260" r:id="rId23"/>
   </p:sldIdLst>
   <p:sldSz cx="9906000" cy="6858000" type="A4"/>
   <p:notesSz cx="6807200" cy="9939338"/>
@@ -229,7 +232,7 @@
           <a:p>
             <a:fld id="{05BF5AB9-3463-4E65-AFD3-5431B79ADFDC}" type="datetimeFigureOut">
               <a:rPr lang="zh-TW" altLang="en-US" smtClean="0"/>
-              <a:t>2020/5/2</a:t>
+              <a:t>2020/5/31</a:t>
             </a:fld>
             <a:endParaRPr lang="zh-TW" altLang="en-US"/>
           </a:p>
@@ -394,7 +397,7 @@
           <a:p>
             <a:fld id="{838FF680-7B6B-4655-B6A1-33A8AD0AE8B4}" type="datetimeFigureOut">
               <a:rPr lang="zh-TW" altLang="en-US" smtClean="0"/>
-              <a:t>2020/5/2</a:t>
+              <a:t>2020/5/31</a:t>
             </a:fld>
             <a:endParaRPr lang="zh-TW" altLang="en-US"/>
           </a:p>
@@ -3029,7 +3032,7 @@
   <p:clrMapOvr>
     <a:masterClrMapping/>
   </p:clrMapOvr>
-  <p:extLst mod="1">
+  <p:extLst>
     <p:ext uri="{DCECCB84-F9BA-43D5-87BE-67443E8EF086}">
       <p15:sldGuideLst xmlns:p15="http://schemas.microsoft.com/office/powerpoint/2012/main">
         <p15:guide id="1" orient="horz" pos="2160">
@@ -6259,6 +6262,1468 @@
           <p:cNvPr id="3" name="投影片編號版面配置區 2">
             <a:extLst>
               <a:ext uri="{FF2B5EF4-FFF2-40B4-BE49-F238E27FC236}">
+                <a16:creationId xmlns:a16="http://schemas.microsoft.com/office/drawing/2014/main" id="{4A3CC275-B456-456A-AD7E-7660FFAA2691}"/>
+              </a:ext>
+            </a:extLst>
+          </p:cNvPr>
+          <p:cNvSpPr>
+            <a:spLocks noGrp="1"/>
+          </p:cNvSpPr>
+          <p:nvPr>
+            <p:ph type="sldNum" sz="quarter" idx="12"/>
+          </p:nvPr>
+        </p:nvSpPr>
+        <p:spPr/>
+        <p:txBody>
+          <a:bodyPr/>
+          <a:lstStyle/>
+          <a:p>
+            <a:fld id="{8F4EACC7-37E3-43A5-A5FB-BEB9CE95D266}" type="slidenum">
+              <a:rPr lang="zh-TW" altLang="en-US" smtClean="0"/>
+              <a:pPr/>
+              <a:t>11</a:t>
+            </a:fld>
+            <a:endParaRPr lang="zh-TW" altLang="en-US"/>
+          </a:p>
+        </p:txBody>
+      </p:sp>
+      <p:sp>
+        <p:nvSpPr>
+          <p:cNvPr id="4" name="標題 3">
+            <a:extLst>
+              <a:ext uri="{FF2B5EF4-FFF2-40B4-BE49-F238E27FC236}">
+                <a16:creationId xmlns:a16="http://schemas.microsoft.com/office/drawing/2014/main" id="{69C28037-B303-4700-AFB1-E4CE617346DA}"/>
+              </a:ext>
+            </a:extLst>
+          </p:cNvPr>
+          <p:cNvSpPr>
+            <a:spLocks noGrp="1"/>
+          </p:cNvSpPr>
+          <p:nvPr>
+            <p:ph type="title"/>
+          </p:nvPr>
+        </p:nvSpPr>
+        <p:spPr/>
+        <p:txBody>
+          <a:bodyPr/>
+          <a:lstStyle/>
+          <a:p>
+            <a:r>
+              <a:rPr lang="en-US" altLang="zh-TW" dirty="0"/>
+              <a:t>Evaluation - </a:t>
+            </a:r>
+            <a:r>
+              <a:rPr lang="en-US" altLang="zh-TW" dirty="0">
+                <a:latin typeface="Microsoft JhengHei"/>
+                <a:ea typeface="Microsoft JhengHei"/>
+                <a:cs typeface="Microsoft JhengHei"/>
+                <a:sym typeface="Microsoft JhengHei"/>
+              </a:rPr>
+              <a:t>Category Data</a:t>
+            </a:r>
+            <a:endParaRPr lang="zh-TW" altLang="en-US" dirty="0"/>
+          </a:p>
+        </p:txBody>
+      </p:sp>
+      <p:grpSp>
+        <p:nvGrpSpPr>
+          <p:cNvPr id="5" name="Google Shape;101;p14">
+            <a:extLst>
+              <a:ext uri="{FF2B5EF4-FFF2-40B4-BE49-F238E27FC236}">
+                <a16:creationId xmlns:a16="http://schemas.microsoft.com/office/drawing/2014/main" id="{3001ED66-359D-4D76-B389-FFAA87852486}"/>
+              </a:ext>
+            </a:extLst>
+          </p:cNvPr>
+          <p:cNvGrpSpPr>
+            <a:grpSpLocks noChangeAspect="1"/>
+          </p:cNvGrpSpPr>
+          <p:nvPr/>
+        </p:nvGrpSpPr>
+        <p:grpSpPr>
+          <a:xfrm>
+            <a:off x="6605893" y="1371600"/>
+            <a:ext cx="3020460" cy="4267200"/>
+            <a:chOff x="5085725" y="1647750"/>
+            <a:chExt cx="2465775" cy="3322375"/>
+          </a:xfrm>
+        </p:grpSpPr>
+        <p:pic>
+          <p:nvPicPr>
+            <p:cNvPr id="6" name="Google Shape;102;p14">
+              <a:extLst>
+                <a:ext uri="{FF2B5EF4-FFF2-40B4-BE49-F238E27FC236}">
+                  <a16:creationId xmlns:a16="http://schemas.microsoft.com/office/drawing/2014/main" id="{C16B064E-47C1-4A17-A68C-9710329D274A}"/>
+                </a:ext>
+              </a:extLst>
+            </p:cNvPr>
+            <p:cNvPicPr preferRelativeResize="0"/>
+            <p:nvPr/>
+          </p:nvPicPr>
+          <p:blipFill rotWithShape="1">
+            <a:blip r:embed="rId2">
+              <a:alphaModFix/>
+            </a:blip>
+            <a:srcRect l="21064" r="23354"/>
+            <a:stretch/>
+          </p:blipFill>
+          <p:spPr>
+            <a:xfrm>
+              <a:off x="5085725" y="1647750"/>
+              <a:ext cx="2465775" cy="3322375"/>
+            </a:xfrm>
+            <a:prstGeom prst="rect">
+              <a:avLst/>
+            </a:prstGeom>
+            <a:noFill/>
+            <a:ln>
+              <a:noFill/>
+            </a:ln>
+          </p:spPr>
+        </p:pic>
+        <p:sp>
+          <p:nvSpPr>
+            <p:cNvPr id="7" name="Google Shape;103;p14">
+              <a:extLst>
+                <a:ext uri="{FF2B5EF4-FFF2-40B4-BE49-F238E27FC236}">
+                  <a16:creationId xmlns:a16="http://schemas.microsoft.com/office/drawing/2014/main" id="{810651BD-0709-4D21-8B8D-9C93CE9617C5}"/>
+                </a:ext>
+              </a:extLst>
+            </p:cNvPr>
+            <p:cNvSpPr/>
+            <p:nvPr/>
+          </p:nvSpPr>
+          <p:spPr>
+            <a:xfrm>
+              <a:off x="5085725" y="1647750"/>
+              <a:ext cx="1647000" cy="514200"/>
+            </a:xfrm>
+            <a:prstGeom prst="rect">
+              <a:avLst/>
+            </a:prstGeom>
+            <a:solidFill>
+              <a:srgbClr val="FFFFFF"/>
+            </a:solidFill>
+            <a:ln>
+              <a:noFill/>
+            </a:ln>
+          </p:spPr>
+          <p:txBody>
+            <a:bodyPr spcFirstLastPara="1" wrap="square" lIns="91425" tIns="91425" rIns="91425" bIns="91425" anchor="ctr" anchorCtr="0">
+              <a:noAutofit/>
+            </a:bodyPr>
+            <a:lstStyle/>
+            <a:p>
+              <a:pPr marL="0" lvl="0" indent="0" algn="l" rtl="0">
+                <a:spcBef>
+                  <a:spcPts val="0"/>
+                </a:spcBef>
+                <a:spcAft>
+                  <a:spcPts val="0"/>
+                </a:spcAft>
+                <a:buNone/>
+              </a:pPr>
+              <a:endParaRPr/>
+            </a:p>
+          </p:txBody>
+        </p:sp>
+      </p:grpSp>
+      <p:pic>
+        <p:nvPicPr>
+          <p:cNvPr id="8" name="Google Shape;104;p14">
+            <a:extLst>
+              <a:ext uri="{FF2B5EF4-FFF2-40B4-BE49-F238E27FC236}">
+                <a16:creationId xmlns:a16="http://schemas.microsoft.com/office/drawing/2014/main" id="{03D294ED-61B5-4007-9221-514E71FED6AE}"/>
+              </a:ext>
+            </a:extLst>
+          </p:cNvPr>
+          <p:cNvPicPr preferRelativeResize="0">
+            <a:picLocks noChangeAspect="1"/>
+          </p:cNvPicPr>
+          <p:nvPr/>
+        </p:nvPicPr>
+        <p:blipFill>
+          <a:blip r:embed="rId3">
+            <a:alphaModFix/>
+          </a:blip>
+          <a:stretch>
+            <a:fillRect/>
+          </a:stretch>
+        </p:blipFill>
+        <p:spPr>
+          <a:xfrm>
+            <a:off x="304800" y="1233350"/>
+            <a:ext cx="6196366" cy="4800600"/>
+          </a:xfrm>
+          <a:prstGeom prst="rect">
+            <a:avLst/>
+          </a:prstGeom>
+          <a:noFill/>
+          <a:ln>
+            <a:noFill/>
+          </a:ln>
+        </p:spPr>
+      </p:pic>
+    </p:spTree>
+    <p:extLst>
+      <p:ext uri="{BB962C8B-B14F-4D97-AF65-F5344CB8AC3E}">
+        <p14:creationId xmlns:p14="http://schemas.microsoft.com/office/powerpoint/2010/main" val="193977871"/>
+      </p:ext>
+    </p:extLst>
+  </p:cSld>
+  <p:clrMapOvr>
+    <a:masterClrMapping/>
+  </p:clrMapOvr>
+</p:sld>
+</file>
+
+<file path=ppt/slides/slide13.xml><?xml version="1.0" encoding="utf-8"?>
+<p:sld xmlns:a="http://schemas.openxmlformats.org/drawingml/2006/main" xmlns:r="http://schemas.openxmlformats.org/officeDocument/2006/relationships" xmlns:p="http://schemas.openxmlformats.org/presentationml/2006/main">
+  <p:cSld>
+    <p:spTree>
+      <p:nvGrpSpPr>
+        <p:cNvPr id="1" name=""/>
+        <p:cNvGrpSpPr/>
+        <p:nvPr/>
+      </p:nvGrpSpPr>
+      <p:grpSpPr>
+        <a:xfrm>
+          <a:off x="0" y="0"/>
+          <a:ext cx="0" cy="0"/>
+          <a:chOff x="0" y="0"/>
+          <a:chExt cx="0" cy="0"/>
+        </a:xfrm>
+      </p:grpSpPr>
+      <p:sp>
+        <p:nvSpPr>
+          <p:cNvPr id="3" name="投影片編號版面配置區 2">
+            <a:extLst>
+              <a:ext uri="{FF2B5EF4-FFF2-40B4-BE49-F238E27FC236}">
+                <a16:creationId xmlns:a16="http://schemas.microsoft.com/office/drawing/2014/main" id="{7417B8A6-D48B-48EB-8FA6-B7713A64A6D4}"/>
+              </a:ext>
+            </a:extLst>
+          </p:cNvPr>
+          <p:cNvSpPr>
+            <a:spLocks noGrp="1"/>
+          </p:cNvSpPr>
+          <p:nvPr>
+            <p:ph type="sldNum" sz="quarter" idx="12"/>
+          </p:nvPr>
+        </p:nvSpPr>
+        <p:spPr/>
+        <p:txBody>
+          <a:bodyPr/>
+          <a:lstStyle/>
+          <a:p>
+            <a:fld id="{8F4EACC7-37E3-43A5-A5FB-BEB9CE95D266}" type="slidenum">
+              <a:rPr lang="zh-TW" altLang="en-US" smtClean="0"/>
+              <a:pPr/>
+              <a:t>12</a:t>
+            </a:fld>
+            <a:endParaRPr lang="zh-TW" altLang="en-US"/>
+          </a:p>
+        </p:txBody>
+      </p:sp>
+      <p:sp>
+        <p:nvSpPr>
+          <p:cNvPr id="4" name="標題 3">
+            <a:extLst>
+              <a:ext uri="{FF2B5EF4-FFF2-40B4-BE49-F238E27FC236}">
+                <a16:creationId xmlns:a16="http://schemas.microsoft.com/office/drawing/2014/main" id="{DCEA1AF2-A972-4A95-990B-C1BEBFE1295D}"/>
+              </a:ext>
+            </a:extLst>
+          </p:cNvPr>
+          <p:cNvSpPr>
+            <a:spLocks noGrp="1"/>
+          </p:cNvSpPr>
+          <p:nvPr>
+            <p:ph type="title"/>
+          </p:nvPr>
+        </p:nvSpPr>
+        <p:spPr/>
+        <p:txBody>
+          <a:bodyPr/>
+          <a:lstStyle/>
+          <a:p>
+            <a:r>
+              <a:rPr lang="en-US" altLang="zh-TW" dirty="0"/>
+              <a:t>Evaluation - </a:t>
+            </a:r>
+            <a:r>
+              <a:rPr lang="en-US" altLang="zh-TW" dirty="0">
+                <a:latin typeface="Microsoft JhengHei"/>
+                <a:ea typeface="Microsoft JhengHei"/>
+                <a:cs typeface="Microsoft JhengHei"/>
+                <a:sym typeface="Microsoft JhengHei"/>
+              </a:rPr>
+              <a:t>Category Data</a:t>
+            </a:r>
+            <a:endParaRPr lang="zh-TW" altLang="en-US" dirty="0"/>
+          </a:p>
+        </p:txBody>
+      </p:sp>
+      <p:sp>
+        <p:nvSpPr>
+          <p:cNvPr id="5" name="Google Shape;462;p39">
+            <a:extLst>
+              <a:ext uri="{FF2B5EF4-FFF2-40B4-BE49-F238E27FC236}">
+                <a16:creationId xmlns:a16="http://schemas.microsoft.com/office/drawing/2014/main" id="{6F9177BA-D420-4395-9E61-5E1DBF1501B1}"/>
+              </a:ext>
+            </a:extLst>
+          </p:cNvPr>
+          <p:cNvSpPr txBox="1">
+            <a:spLocks/>
+          </p:cNvSpPr>
+          <p:nvPr/>
+        </p:nvSpPr>
+        <p:spPr bwMode="ltGray">
+          <a:xfrm>
+            <a:off x="1446600" y="461338"/>
+            <a:ext cx="2290500" cy="342900"/>
+          </a:xfrm>
+          <a:prstGeom prst="rect">
+            <a:avLst/>
+          </a:prstGeom>
+        </p:spPr>
+        <p:txBody>
+          <a:bodyPr spcFirstLastPara="1" vert="horz" wrap="square" lIns="91425" tIns="45700" rIns="91425" bIns="45700" rtlCol="0" anchor="ctr" anchorCtr="0">
+            <a:noAutofit/>
+          </a:bodyPr>
+          <a:lstStyle>
+            <a:lvl1pPr marL="342900" indent="-342900" algn="l" defTabSz="914400" rtl="0" eaLnBrk="1" latinLnBrk="0" hangingPunct="1">
+              <a:lnSpc>
+                <a:spcPct val="100000"/>
+              </a:lnSpc>
+              <a:spcBef>
+                <a:spcPts val="600"/>
+              </a:spcBef>
+              <a:spcAft>
+                <a:spcPts val="600"/>
+              </a:spcAft>
+              <a:buClr>
+                <a:schemeClr val="accent1"/>
+              </a:buClr>
+              <a:buFont typeface="Arial" pitchFamily="34" charset="0"/>
+              <a:buChar char="•"/>
+              <a:defRPr sz="2800" b="1" kern="1200">
+                <a:solidFill>
+                  <a:srgbClr val="393939"/>
+                </a:solidFill>
+                <a:latin typeface="微軟正黑體" pitchFamily="34" charset="-120"/>
+                <a:ea typeface="微軟正黑體" pitchFamily="34" charset="-120"/>
+                <a:cs typeface="+mn-cs"/>
+              </a:defRPr>
+            </a:lvl1pPr>
+            <a:lvl2pPr marL="714375" indent="-352425" algn="l" defTabSz="914400" rtl="0" eaLnBrk="1" latinLnBrk="0" hangingPunct="1">
+              <a:lnSpc>
+                <a:spcPct val="100000"/>
+              </a:lnSpc>
+              <a:spcBef>
+                <a:spcPts val="600"/>
+              </a:spcBef>
+              <a:spcAft>
+                <a:spcPts val="600"/>
+              </a:spcAft>
+              <a:buClr>
+                <a:schemeClr val="accent2"/>
+              </a:buClr>
+              <a:buFont typeface="Arial" pitchFamily="34" charset="0"/>
+              <a:buChar char="–"/>
+              <a:defRPr sz="2400" b="1" kern="1200">
+                <a:solidFill>
+                  <a:srgbClr val="393939"/>
+                </a:solidFill>
+                <a:latin typeface="微軟正黑體" pitchFamily="34" charset="-120"/>
+                <a:ea typeface="微軟正黑體" pitchFamily="34" charset="-120"/>
+                <a:cs typeface="+mn-cs"/>
+              </a:defRPr>
+            </a:lvl2pPr>
+            <a:lvl3pPr marL="1076325" indent="-266700" algn="l" defTabSz="914400" rtl="0" eaLnBrk="1" latinLnBrk="0" hangingPunct="1">
+              <a:lnSpc>
+                <a:spcPct val="100000"/>
+              </a:lnSpc>
+              <a:spcBef>
+                <a:spcPts val="600"/>
+              </a:spcBef>
+              <a:spcAft>
+                <a:spcPts val="600"/>
+              </a:spcAft>
+              <a:buClr>
+                <a:schemeClr val="accent3"/>
+              </a:buClr>
+              <a:buFont typeface="Arial" pitchFamily="34" charset="0"/>
+              <a:buChar char="•"/>
+              <a:defRPr sz="2000" kern="1200">
+                <a:solidFill>
+                  <a:srgbClr val="393939"/>
+                </a:solidFill>
+                <a:latin typeface="微軟正黑體" pitchFamily="34" charset="-120"/>
+                <a:ea typeface="微軟正黑體" pitchFamily="34" charset="-120"/>
+                <a:cs typeface="+mn-cs"/>
+              </a:defRPr>
+            </a:lvl3pPr>
+            <a:lvl4pPr marL="1343025" indent="-180975" algn="l" defTabSz="914400" rtl="0" eaLnBrk="1" latinLnBrk="0" hangingPunct="1">
+              <a:lnSpc>
+                <a:spcPct val="100000"/>
+              </a:lnSpc>
+              <a:spcBef>
+                <a:spcPts val="600"/>
+              </a:spcBef>
+              <a:spcAft>
+                <a:spcPts val="600"/>
+              </a:spcAft>
+              <a:buClr>
+                <a:schemeClr val="accent4"/>
+              </a:buClr>
+              <a:buFont typeface="Arial" pitchFamily="34" charset="0"/>
+              <a:buChar char="–"/>
+              <a:defRPr sz="1800" kern="1200">
+                <a:solidFill>
+                  <a:srgbClr val="393939"/>
+                </a:solidFill>
+                <a:latin typeface="微軟正黑體" pitchFamily="34" charset="-120"/>
+                <a:ea typeface="微軟正黑體" pitchFamily="34" charset="-120"/>
+                <a:cs typeface="+mn-cs"/>
+              </a:defRPr>
+            </a:lvl4pPr>
+            <a:lvl5pPr marL="1619250" indent="-276225" algn="l" defTabSz="914400" rtl="0" eaLnBrk="1" latinLnBrk="0" hangingPunct="1">
+              <a:lnSpc>
+                <a:spcPct val="100000"/>
+              </a:lnSpc>
+              <a:spcBef>
+                <a:spcPts val="600"/>
+              </a:spcBef>
+              <a:spcAft>
+                <a:spcPts val="600"/>
+              </a:spcAft>
+              <a:buClr>
+                <a:schemeClr val="accent5"/>
+              </a:buClr>
+              <a:buFont typeface="Arial" pitchFamily="34" charset="0"/>
+              <a:buChar char="»"/>
+              <a:tabLst>
+                <a:tab pos="7981950" algn="l"/>
+              </a:tabLst>
+              <a:defRPr sz="1800" kern="1200">
+                <a:solidFill>
+                  <a:srgbClr val="393939"/>
+                </a:solidFill>
+                <a:latin typeface="微軟正黑體" pitchFamily="34" charset="-120"/>
+                <a:ea typeface="微軟正黑體" pitchFamily="34" charset="-120"/>
+                <a:cs typeface="+mn-cs"/>
+              </a:defRPr>
+            </a:lvl5pPr>
+            <a:lvl6pPr marL="2514600" indent="-228600" algn="l" defTabSz="914400" rtl="0" eaLnBrk="1" latinLnBrk="0" hangingPunct="1">
+              <a:spcBef>
+                <a:spcPct val="20000"/>
+              </a:spcBef>
+              <a:buFont typeface="Arial" pitchFamily="34" charset="0"/>
+              <a:buChar char="•"/>
+              <a:defRPr sz="2000" kern="1200">
+                <a:solidFill>
+                  <a:schemeClr val="tx1"/>
+                </a:solidFill>
+                <a:latin typeface="+mn-lt"/>
+                <a:ea typeface="+mn-ea"/>
+                <a:cs typeface="+mn-cs"/>
+              </a:defRPr>
+            </a:lvl6pPr>
+            <a:lvl7pPr marL="2971800" indent="-228600" algn="l" defTabSz="914400" rtl="0" eaLnBrk="1" latinLnBrk="0" hangingPunct="1">
+              <a:spcBef>
+                <a:spcPct val="20000"/>
+              </a:spcBef>
+              <a:buFont typeface="Arial" pitchFamily="34" charset="0"/>
+              <a:buChar char="•"/>
+              <a:defRPr sz="2000" kern="1200">
+                <a:solidFill>
+                  <a:schemeClr val="tx1"/>
+                </a:solidFill>
+                <a:latin typeface="+mn-lt"/>
+                <a:ea typeface="+mn-ea"/>
+                <a:cs typeface="+mn-cs"/>
+              </a:defRPr>
+            </a:lvl7pPr>
+            <a:lvl8pPr marL="3429000" indent="-228600" algn="l" defTabSz="914400" rtl="0" eaLnBrk="1" latinLnBrk="0" hangingPunct="1">
+              <a:spcBef>
+                <a:spcPct val="20000"/>
+              </a:spcBef>
+              <a:buFont typeface="Arial" pitchFamily="34" charset="0"/>
+              <a:buChar char="•"/>
+              <a:defRPr sz="2000" kern="1200">
+                <a:solidFill>
+                  <a:schemeClr val="tx1"/>
+                </a:solidFill>
+                <a:latin typeface="+mn-lt"/>
+                <a:ea typeface="+mn-ea"/>
+                <a:cs typeface="+mn-cs"/>
+              </a:defRPr>
+            </a:lvl8pPr>
+            <a:lvl9pPr marL="3886200" indent="-228600" algn="l" defTabSz="914400" rtl="0" eaLnBrk="1" latinLnBrk="0" hangingPunct="1">
+              <a:spcBef>
+                <a:spcPct val="20000"/>
+              </a:spcBef>
+              <a:buFont typeface="Arial" pitchFamily="34" charset="0"/>
+              <a:buChar char="•"/>
+              <a:defRPr sz="2000" kern="1200">
+                <a:solidFill>
+                  <a:schemeClr val="tx1"/>
+                </a:solidFill>
+                <a:latin typeface="+mn-lt"/>
+                <a:ea typeface="+mn-ea"/>
+                <a:cs typeface="+mn-cs"/>
+              </a:defRPr>
+            </a:lvl9pPr>
+          </a:lstStyle>
+          <a:p>
+            <a:pPr marL="0" indent="0">
+              <a:spcBef>
+                <a:spcPts val="360"/>
+              </a:spcBef>
+              <a:spcAft>
+                <a:spcPts val="0"/>
+              </a:spcAft>
+              <a:buFont typeface="Arial" pitchFamily="34" charset="0"/>
+              <a:buNone/>
+            </a:pPr>
+            <a:r>
+              <a:rPr lang="zh-TW" altLang="en-US" sz="1800"/>
+              <a:t>預測結果</a:t>
+            </a:r>
+            <a:r>
+              <a:rPr lang="en-US" altLang="zh-TW" sz="1800"/>
+              <a:t>(</a:t>
+            </a:r>
+            <a:r>
+              <a:rPr lang="zh-TW" altLang="en-US" sz="1800"/>
+              <a:t>機率</a:t>
+            </a:r>
+            <a:r>
+              <a:rPr lang="en-US" altLang="zh-TW" sz="1800"/>
+              <a:t>)</a:t>
+            </a:r>
+            <a:endParaRPr lang="zh-TW" altLang="en-US" sz="1800"/>
+          </a:p>
+        </p:txBody>
+      </p:sp>
+      <p:sp>
+        <p:nvSpPr>
+          <p:cNvPr id="6" name="Google Shape;464;p39">
+            <a:extLst>
+              <a:ext uri="{FF2B5EF4-FFF2-40B4-BE49-F238E27FC236}">
+                <a16:creationId xmlns:a16="http://schemas.microsoft.com/office/drawing/2014/main" id="{B1A1F6E1-E848-4087-9383-808F6218AF7C}"/>
+              </a:ext>
+            </a:extLst>
+          </p:cNvPr>
+          <p:cNvSpPr/>
+          <p:nvPr/>
+        </p:nvSpPr>
+        <p:spPr>
+          <a:xfrm>
+            <a:off x="572625" y="572488"/>
+            <a:ext cx="683100" cy="120600"/>
+          </a:xfrm>
+          <a:prstGeom prst="rect">
+            <a:avLst/>
+          </a:prstGeom>
+          <a:solidFill>
+            <a:srgbClr val="4A86E8"/>
+          </a:solidFill>
+          <a:ln>
+            <a:noFill/>
+          </a:ln>
+        </p:spPr>
+        <p:txBody>
+          <a:bodyPr spcFirstLastPara="1" wrap="square" lIns="91425" tIns="91425" rIns="91425" bIns="91425" anchor="ctr" anchorCtr="0">
+            <a:noAutofit/>
+          </a:bodyPr>
+          <a:lstStyle/>
+          <a:p>
+            <a:pPr marL="0" lvl="0" indent="0" algn="l" rtl="0">
+              <a:spcBef>
+                <a:spcPts val="0"/>
+              </a:spcBef>
+              <a:spcAft>
+                <a:spcPts val="0"/>
+              </a:spcAft>
+              <a:buNone/>
+            </a:pPr>
+            <a:endParaRPr/>
+          </a:p>
+        </p:txBody>
+      </p:sp>
+      <p:sp>
+        <p:nvSpPr>
+          <p:cNvPr id="7" name="Google Shape;465;p39">
+            <a:extLst>
+              <a:ext uri="{FF2B5EF4-FFF2-40B4-BE49-F238E27FC236}">
+                <a16:creationId xmlns:a16="http://schemas.microsoft.com/office/drawing/2014/main" id="{A5937669-A01F-4789-9164-9FB573B65A56}"/>
+              </a:ext>
+            </a:extLst>
+          </p:cNvPr>
+          <p:cNvSpPr/>
+          <p:nvPr/>
+        </p:nvSpPr>
+        <p:spPr>
+          <a:xfrm>
+            <a:off x="572625" y="976038"/>
+            <a:ext cx="683100" cy="120600"/>
+          </a:xfrm>
+          <a:prstGeom prst="rect">
+            <a:avLst/>
+          </a:prstGeom>
+          <a:solidFill>
+            <a:srgbClr val="FF9900"/>
+          </a:solidFill>
+          <a:ln>
+            <a:noFill/>
+          </a:ln>
+        </p:spPr>
+        <p:txBody>
+          <a:bodyPr spcFirstLastPara="1" wrap="square" lIns="91425" tIns="91425" rIns="91425" bIns="91425" anchor="ctr" anchorCtr="0">
+            <a:noAutofit/>
+          </a:bodyPr>
+          <a:lstStyle/>
+          <a:p>
+            <a:pPr marL="0" lvl="0" indent="0" algn="l" rtl="0">
+              <a:spcBef>
+                <a:spcPts val="0"/>
+              </a:spcBef>
+              <a:spcAft>
+                <a:spcPts val="0"/>
+              </a:spcAft>
+              <a:buNone/>
+            </a:pPr>
+            <a:endParaRPr/>
+          </a:p>
+        </p:txBody>
+      </p:sp>
+      <p:sp>
+        <p:nvSpPr>
+          <p:cNvPr id="8" name="Google Shape;466;p39">
+            <a:extLst>
+              <a:ext uri="{FF2B5EF4-FFF2-40B4-BE49-F238E27FC236}">
+                <a16:creationId xmlns:a16="http://schemas.microsoft.com/office/drawing/2014/main" id="{6936DB68-2A34-4AFD-B4FC-375A7064100D}"/>
+              </a:ext>
+            </a:extLst>
+          </p:cNvPr>
+          <p:cNvSpPr/>
+          <p:nvPr/>
+        </p:nvSpPr>
+        <p:spPr>
+          <a:xfrm>
+            <a:off x="572625" y="1379588"/>
+            <a:ext cx="683100" cy="120600"/>
+          </a:xfrm>
+          <a:prstGeom prst="rect">
+            <a:avLst/>
+          </a:prstGeom>
+          <a:solidFill>
+            <a:srgbClr val="6AA84F"/>
+          </a:solidFill>
+          <a:ln>
+            <a:noFill/>
+          </a:ln>
+        </p:spPr>
+        <p:txBody>
+          <a:bodyPr spcFirstLastPara="1" wrap="square" lIns="91425" tIns="91425" rIns="91425" bIns="91425" anchor="ctr" anchorCtr="0">
+            <a:noAutofit/>
+          </a:bodyPr>
+          <a:lstStyle/>
+          <a:p>
+            <a:pPr marL="0" lvl="0" indent="0" algn="l" rtl="0">
+              <a:spcBef>
+                <a:spcPts val="0"/>
+              </a:spcBef>
+              <a:spcAft>
+                <a:spcPts val="0"/>
+              </a:spcAft>
+              <a:buNone/>
+            </a:pPr>
+            <a:endParaRPr/>
+          </a:p>
+        </p:txBody>
+      </p:sp>
+      <p:sp>
+        <p:nvSpPr>
+          <p:cNvPr id="9" name="Google Shape;467;p39">
+            <a:extLst>
+              <a:ext uri="{FF2B5EF4-FFF2-40B4-BE49-F238E27FC236}">
+                <a16:creationId xmlns:a16="http://schemas.microsoft.com/office/drawing/2014/main" id="{E354B2B8-5153-4D89-995F-939BEB8D7361}"/>
+              </a:ext>
+            </a:extLst>
+          </p:cNvPr>
+          <p:cNvSpPr txBox="1">
+            <a:spLocks/>
+          </p:cNvSpPr>
+          <p:nvPr/>
+        </p:nvSpPr>
+        <p:spPr bwMode="ltGray">
+          <a:xfrm>
+            <a:off x="1446600" y="864888"/>
+            <a:ext cx="2290500" cy="342900"/>
+          </a:xfrm>
+          <a:prstGeom prst="rect">
+            <a:avLst/>
+          </a:prstGeom>
+        </p:spPr>
+        <p:txBody>
+          <a:bodyPr spcFirstLastPara="1" vert="horz" wrap="square" lIns="91425" tIns="45700" rIns="91425" bIns="45700" rtlCol="0" anchor="ctr" anchorCtr="0">
+            <a:noAutofit/>
+          </a:bodyPr>
+          <a:lstStyle>
+            <a:lvl1pPr marL="342900" indent="-342900" algn="l" defTabSz="914400" rtl="0" eaLnBrk="1" latinLnBrk="0" hangingPunct="1">
+              <a:lnSpc>
+                <a:spcPct val="100000"/>
+              </a:lnSpc>
+              <a:spcBef>
+                <a:spcPts val="600"/>
+              </a:spcBef>
+              <a:spcAft>
+                <a:spcPts val="600"/>
+              </a:spcAft>
+              <a:buClr>
+                <a:schemeClr val="accent1"/>
+              </a:buClr>
+              <a:buFont typeface="Arial" pitchFamily="34" charset="0"/>
+              <a:buChar char="•"/>
+              <a:defRPr sz="2800" b="1" kern="1200">
+                <a:solidFill>
+                  <a:srgbClr val="393939"/>
+                </a:solidFill>
+                <a:latin typeface="微軟正黑體" pitchFamily="34" charset="-120"/>
+                <a:ea typeface="微軟正黑體" pitchFamily="34" charset="-120"/>
+                <a:cs typeface="+mn-cs"/>
+              </a:defRPr>
+            </a:lvl1pPr>
+            <a:lvl2pPr marL="714375" indent="-352425" algn="l" defTabSz="914400" rtl="0" eaLnBrk="1" latinLnBrk="0" hangingPunct="1">
+              <a:lnSpc>
+                <a:spcPct val="100000"/>
+              </a:lnSpc>
+              <a:spcBef>
+                <a:spcPts val="600"/>
+              </a:spcBef>
+              <a:spcAft>
+                <a:spcPts val="600"/>
+              </a:spcAft>
+              <a:buClr>
+                <a:schemeClr val="accent2"/>
+              </a:buClr>
+              <a:buFont typeface="Arial" pitchFamily="34" charset="0"/>
+              <a:buChar char="–"/>
+              <a:defRPr sz="2400" b="1" kern="1200">
+                <a:solidFill>
+                  <a:srgbClr val="393939"/>
+                </a:solidFill>
+                <a:latin typeface="微軟正黑體" pitchFamily="34" charset="-120"/>
+                <a:ea typeface="微軟正黑體" pitchFamily="34" charset="-120"/>
+                <a:cs typeface="+mn-cs"/>
+              </a:defRPr>
+            </a:lvl2pPr>
+            <a:lvl3pPr marL="1076325" indent="-266700" algn="l" defTabSz="914400" rtl="0" eaLnBrk="1" latinLnBrk="0" hangingPunct="1">
+              <a:lnSpc>
+                <a:spcPct val="100000"/>
+              </a:lnSpc>
+              <a:spcBef>
+                <a:spcPts val="600"/>
+              </a:spcBef>
+              <a:spcAft>
+                <a:spcPts val="600"/>
+              </a:spcAft>
+              <a:buClr>
+                <a:schemeClr val="accent3"/>
+              </a:buClr>
+              <a:buFont typeface="Arial" pitchFamily="34" charset="0"/>
+              <a:buChar char="•"/>
+              <a:defRPr sz="2000" kern="1200">
+                <a:solidFill>
+                  <a:srgbClr val="393939"/>
+                </a:solidFill>
+                <a:latin typeface="微軟正黑體" pitchFamily="34" charset="-120"/>
+                <a:ea typeface="微軟正黑體" pitchFamily="34" charset="-120"/>
+                <a:cs typeface="+mn-cs"/>
+              </a:defRPr>
+            </a:lvl3pPr>
+            <a:lvl4pPr marL="1343025" indent="-180975" algn="l" defTabSz="914400" rtl="0" eaLnBrk="1" latinLnBrk="0" hangingPunct="1">
+              <a:lnSpc>
+                <a:spcPct val="100000"/>
+              </a:lnSpc>
+              <a:spcBef>
+                <a:spcPts val="600"/>
+              </a:spcBef>
+              <a:spcAft>
+                <a:spcPts val="600"/>
+              </a:spcAft>
+              <a:buClr>
+                <a:schemeClr val="accent4"/>
+              </a:buClr>
+              <a:buFont typeface="Arial" pitchFamily="34" charset="0"/>
+              <a:buChar char="–"/>
+              <a:defRPr sz="1800" kern="1200">
+                <a:solidFill>
+                  <a:srgbClr val="393939"/>
+                </a:solidFill>
+                <a:latin typeface="微軟正黑體" pitchFamily="34" charset="-120"/>
+                <a:ea typeface="微軟正黑體" pitchFamily="34" charset="-120"/>
+                <a:cs typeface="+mn-cs"/>
+              </a:defRPr>
+            </a:lvl4pPr>
+            <a:lvl5pPr marL="1619250" indent="-276225" algn="l" defTabSz="914400" rtl="0" eaLnBrk="1" latinLnBrk="0" hangingPunct="1">
+              <a:lnSpc>
+                <a:spcPct val="100000"/>
+              </a:lnSpc>
+              <a:spcBef>
+                <a:spcPts val="600"/>
+              </a:spcBef>
+              <a:spcAft>
+                <a:spcPts val="600"/>
+              </a:spcAft>
+              <a:buClr>
+                <a:schemeClr val="accent5"/>
+              </a:buClr>
+              <a:buFont typeface="Arial" pitchFamily="34" charset="0"/>
+              <a:buChar char="»"/>
+              <a:tabLst>
+                <a:tab pos="7981950" algn="l"/>
+              </a:tabLst>
+              <a:defRPr sz="1800" kern="1200">
+                <a:solidFill>
+                  <a:srgbClr val="393939"/>
+                </a:solidFill>
+                <a:latin typeface="微軟正黑體" pitchFamily="34" charset="-120"/>
+                <a:ea typeface="微軟正黑體" pitchFamily="34" charset="-120"/>
+                <a:cs typeface="+mn-cs"/>
+              </a:defRPr>
+            </a:lvl5pPr>
+            <a:lvl6pPr marL="2514600" indent="-228600" algn="l" defTabSz="914400" rtl="0" eaLnBrk="1" latinLnBrk="0" hangingPunct="1">
+              <a:spcBef>
+                <a:spcPct val="20000"/>
+              </a:spcBef>
+              <a:buFont typeface="Arial" pitchFamily="34" charset="0"/>
+              <a:buChar char="•"/>
+              <a:defRPr sz="2000" kern="1200">
+                <a:solidFill>
+                  <a:schemeClr val="tx1"/>
+                </a:solidFill>
+                <a:latin typeface="+mn-lt"/>
+                <a:ea typeface="+mn-ea"/>
+                <a:cs typeface="+mn-cs"/>
+              </a:defRPr>
+            </a:lvl6pPr>
+            <a:lvl7pPr marL="2971800" indent="-228600" algn="l" defTabSz="914400" rtl="0" eaLnBrk="1" latinLnBrk="0" hangingPunct="1">
+              <a:spcBef>
+                <a:spcPct val="20000"/>
+              </a:spcBef>
+              <a:buFont typeface="Arial" pitchFamily="34" charset="0"/>
+              <a:buChar char="•"/>
+              <a:defRPr sz="2000" kern="1200">
+                <a:solidFill>
+                  <a:schemeClr val="tx1"/>
+                </a:solidFill>
+                <a:latin typeface="+mn-lt"/>
+                <a:ea typeface="+mn-ea"/>
+                <a:cs typeface="+mn-cs"/>
+              </a:defRPr>
+            </a:lvl7pPr>
+            <a:lvl8pPr marL="3429000" indent="-228600" algn="l" defTabSz="914400" rtl="0" eaLnBrk="1" latinLnBrk="0" hangingPunct="1">
+              <a:spcBef>
+                <a:spcPct val="20000"/>
+              </a:spcBef>
+              <a:buFont typeface="Arial" pitchFamily="34" charset="0"/>
+              <a:buChar char="•"/>
+              <a:defRPr sz="2000" kern="1200">
+                <a:solidFill>
+                  <a:schemeClr val="tx1"/>
+                </a:solidFill>
+                <a:latin typeface="+mn-lt"/>
+                <a:ea typeface="+mn-ea"/>
+                <a:cs typeface="+mn-cs"/>
+              </a:defRPr>
+            </a:lvl8pPr>
+            <a:lvl9pPr marL="3886200" indent="-228600" algn="l" defTabSz="914400" rtl="0" eaLnBrk="1" latinLnBrk="0" hangingPunct="1">
+              <a:spcBef>
+                <a:spcPct val="20000"/>
+              </a:spcBef>
+              <a:buFont typeface="Arial" pitchFamily="34" charset="0"/>
+              <a:buChar char="•"/>
+              <a:defRPr sz="2000" kern="1200">
+                <a:solidFill>
+                  <a:schemeClr val="tx1"/>
+                </a:solidFill>
+                <a:latin typeface="+mn-lt"/>
+                <a:ea typeface="+mn-ea"/>
+                <a:cs typeface="+mn-cs"/>
+              </a:defRPr>
+            </a:lvl9pPr>
+          </a:lstStyle>
+          <a:p>
+            <a:pPr marL="0" indent="0">
+              <a:spcBef>
+                <a:spcPts val="360"/>
+              </a:spcBef>
+              <a:spcAft>
+                <a:spcPts val="0"/>
+              </a:spcAft>
+              <a:buFont typeface="Arial" pitchFamily="34" charset="0"/>
+              <a:buNone/>
+            </a:pPr>
+            <a:r>
+              <a:rPr lang="zh-TW" altLang="en-US" sz="1800"/>
+              <a:t>油層位置</a:t>
+            </a:r>
+            <a:endParaRPr lang="zh-TW" altLang="en-US" sz="1800" dirty="0"/>
+          </a:p>
+        </p:txBody>
+      </p:sp>
+      <p:sp>
+        <p:nvSpPr>
+          <p:cNvPr id="10" name="Google Shape;468;p39">
+            <a:extLst>
+              <a:ext uri="{FF2B5EF4-FFF2-40B4-BE49-F238E27FC236}">
+                <a16:creationId xmlns:a16="http://schemas.microsoft.com/office/drawing/2014/main" id="{23669E01-0918-4D2E-990C-2D662B422A4E}"/>
+              </a:ext>
+            </a:extLst>
+          </p:cNvPr>
+          <p:cNvSpPr txBox="1">
+            <a:spLocks/>
+          </p:cNvSpPr>
+          <p:nvPr/>
+        </p:nvSpPr>
+        <p:spPr bwMode="ltGray">
+          <a:xfrm>
+            <a:off x="1446588" y="1268438"/>
+            <a:ext cx="2290500" cy="342900"/>
+          </a:xfrm>
+          <a:prstGeom prst="rect">
+            <a:avLst/>
+          </a:prstGeom>
+        </p:spPr>
+        <p:txBody>
+          <a:bodyPr spcFirstLastPara="1" vert="horz" wrap="square" lIns="91425" tIns="45700" rIns="91425" bIns="45700" rtlCol="0" anchor="ctr" anchorCtr="0">
+            <a:noAutofit/>
+          </a:bodyPr>
+          <a:lstStyle>
+            <a:lvl1pPr marL="342900" indent="-342900" algn="l" defTabSz="914400" rtl="0" eaLnBrk="1" latinLnBrk="0" hangingPunct="1">
+              <a:lnSpc>
+                <a:spcPct val="100000"/>
+              </a:lnSpc>
+              <a:spcBef>
+                <a:spcPts val="600"/>
+              </a:spcBef>
+              <a:spcAft>
+                <a:spcPts val="600"/>
+              </a:spcAft>
+              <a:buClr>
+                <a:schemeClr val="accent1"/>
+              </a:buClr>
+              <a:buFont typeface="Arial" pitchFamily="34" charset="0"/>
+              <a:buChar char="•"/>
+              <a:defRPr sz="2800" b="1" kern="1200">
+                <a:solidFill>
+                  <a:srgbClr val="393939"/>
+                </a:solidFill>
+                <a:latin typeface="微軟正黑體" pitchFamily="34" charset="-120"/>
+                <a:ea typeface="微軟正黑體" pitchFamily="34" charset="-120"/>
+                <a:cs typeface="+mn-cs"/>
+              </a:defRPr>
+            </a:lvl1pPr>
+            <a:lvl2pPr marL="714375" indent="-352425" algn="l" defTabSz="914400" rtl="0" eaLnBrk="1" latinLnBrk="0" hangingPunct="1">
+              <a:lnSpc>
+                <a:spcPct val="100000"/>
+              </a:lnSpc>
+              <a:spcBef>
+                <a:spcPts val="600"/>
+              </a:spcBef>
+              <a:spcAft>
+                <a:spcPts val="600"/>
+              </a:spcAft>
+              <a:buClr>
+                <a:schemeClr val="accent2"/>
+              </a:buClr>
+              <a:buFont typeface="Arial" pitchFamily="34" charset="0"/>
+              <a:buChar char="–"/>
+              <a:defRPr sz="2400" b="1" kern="1200">
+                <a:solidFill>
+                  <a:srgbClr val="393939"/>
+                </a:solidFill>
+                <a:latin typeface="微軟正黑體" pitchFamily="34" charset="-120"/>
+                <a:ea typeface="微軟正黑體" pitchFamily="34" charset="-120"/>
+                <a:cs typeface="+mn-cs"/>
+              </a:defRPr>
+            </a:lvl2pPr>
+            <a:lvl3pPr marL="1076325" indent="-266700" algn="l" defTabSz="914400" rtl="0" eaLnBrk="1" latinLnBrk="0" hangingPunct="1">
+              <a:lnSpc>
+                <a:spcPct val="100000"/>
+              </a:lnSpc>
+              <a:spcBef>
+                <a:spcPts val="600"/>
+              </a:spcBef>
+              <a:spcAft>
+                <a:spcPts val="600"/>
+              </a:spcAft>
+              <a:buClr>
+                <a:schemeClr val="accent3"/>
+              </a:buClr>
+              <a:buFont typeface="Arial" pitchFamily="34" charset="0"/>
+              <a:buChar char="•"/>
+              <a:defRPr sz="2000" kern="1200">
+                <a:solidFill>
+                  <a:srgbClr val="393939"/>
+                </a:solidFill>
+                <a:latin typeface="微軟正黑體" pitchFamily="34" charset="-120"/>
+                <a:ea typeface="微軟正黑體" pitchFamily="34" charset="-120"/>
+                <a:cs typeface="+mn-cs"/>
+              </a:defRPr>
+            </a:lvl3pPr>
+            <a:lvl4pPr marL="1343025" indent="-180975" algn="l" defTabSz="914400" rtl="0" eaLnBrk="1" latinLnBrk="0" hangingPunct="1">
+              <a:lnSpc>
+                <a:spcPct val="100000"/>
+              </a:lnSpc>
+              <a:spcBef>
+                <a:spcPts val="600"/>
+              </a:spcBef>
+              <a:spcAft>
+                <a:spcPts val="600"/>
+              </a:spcAft>
+              <a:buClr>
+                <a:schemeClr val="accent4"/>
+              </a:buClr>
+              <a:buFont typeface="Arial" pitchFamily="34" charset="0"/>
+              <a:buChar char="–"/>
+              <a:defRPr sz="1800" kern="1200">
+                <a:solidFill>
+                  <a:srgbClr val="393939"/>
+                </a:solidFill>
+                <a:latin typeface="微軟正黑體" pitchFamily="34" charset="-120"/>
+                <a:ea typeface="微軟正黑體" pitchFamily="34" charset="-120"/>
+                <a:cs typeface="+mn-cs"/>
+              </a:defRPr>
+            </a:lvl4pPr>
+            <a:lvl5pPr marL="1619250" indent="-276225" algn="l" defTabSz="914400" rtl="0" eaLnBrk="1" latinLnBrk="0" hangingPunct="1">
+              <a:lnSpc>
+                <a:spcPct val="100000"/>
+              </a:lnSpc>
+              <a:spcBef>
+                <a:spcPts val="600"/>
+              </a:spcBef>
+              <a:spcAft>
+                <a:spcPts val="600"/>
+              </a:spcAft>
+              <a:buClr>
+                <a:schemeClr val="accent5"/>
+              </a:buClr>
+              <a:buFont typeface="Arial" pitchFamily="34" charset="0"/>
+              <a:buChar char="»"/>
+              <a:tabLst>
+                <a:tab pos="7981950" algn="l"/>
+              </a:tabLst>
+              <a:defRPr sz="1800" kern="1200">
+                <a:solidFill>
+                  <a:srgbClr val="393939"/>
+                </a:solidFill>
+                <a:latin typeface="微軟正黑體" pitchFamily="34" charset="-120"/>
+                <a:ea typeface="微軟正黑體" pitchFamily="34" charset="-120"/>
+                <a:cs typeface="+mn-cs"/>
+              </a:defRPr>
+            </a:lvl5pPr>
+            <a:lvl6pPr marL="2514600" indent="-228600" algn="l" defTabSz="914400" rtl="0" eaLnBrk="1" latinLnBrk="0" hangingPunct="1">
+              <a:spcBef>
+                <a:spcPct val="20000"/>
+              </a:spcBef>
+              <a:buFont typeface="Arial" pitchFamily="34" charset="0"/>
+              <a:buChar char="•"/>
+              <a:defRPr sz="2000" kern="1200">
+                <a:solidFill>
+                  <a:schemeClr val="tx1"/>
+                </a:solidFill>
+                <a:latin typeface="+mn-lt"/>
+                <a:ea typeface="+mn-ea"/>
+                <a:cs typeface="+mn-cs"/>
+              </a:defRPr>
+            </a:lvl6pPr>
+            <a:lvl7pPr marL="2971800" indent="-228600" algn="l" defTabSz="914400" rtl="0" eaLnBrk="1" latinLnBrk="0" hangingPunct="1">
+              <a:spcBef>
+                <a:spcPct val="20000"/>
+              </a:spcBef>
+              <a:buFont typeface="Arial" pitchFamily="34" charset="0"/>
+              <a:buChar char="•"/>
+              <a:defRPr sz="2000" kern="1200">
+                <a:solidFill>
+                  <a:schemeClr val="tx1"/>
+                </a:solidFill>
+                <a:latin typeface="+mn-lt"/>
+                <a:ea typeface="+mn-ea"/>
+                <a:cs typeface="+mn-cs"/>
+              </a:defRPr>
+            </a:lvl7pPr>
+            <a:lvl8pPr marL="3429000" indent="-228600" algn="l" defTabSz="914400" rtl="0" eaLnBrk="1" latinLnBrk="0" hangingPunct="1">
+              <a:spcBef>
+                <a:spcPct val="20000"/>
+              </a:spcBef>
+              <a:buFont typeface="Arial" pitchFamily="34" charset="0"/>
+              <a:buChar char="•"/>
+              <a:defRPr sz="2000" kern="1200">
+                <a:solidFill>
+                  <a:schemeClr val="tx1"/>
+                </a:solidFill>
+                <a:latin typeface="+mn-lt"/>
+                <a:ea typeface="+mn-ea"/>
+                <a:cs typeface="+mn-cs"/>
+              </a:defRPr>
+            </a:lvl8pPr>
+            <a:lvl9pPr marL="3886200" indent="-228600" algn="l" defTabSz="914400" rtl="0" eaLnBrk="1" latinLnBrk="0" hangingPunct="1">
+              <a:spcBef>
+                <a:spcPct val="20000"/>
+              </a:spcBef>
+              <a:buFont typeface="Arial" pitchFamily="34" charset="0"/>
+              <a:buChar char="•"/>
+              <a:defRPr sz="2000" kern="1200">
+                <a:solidFill>
+                  <a:schemeClr val="tx1"/>
+                </a:solidFill>
+                <a:latin typeface="+mn-lt"/>
+                <a:ea typeface="+mn-ea"/>
+                <a:cs typeface="+mn-cs"/>
+              </a:defRPr>
+            </a:lvl9pPr>
+          </a:lstStyle>
+          <a:p>
+            <a:pPr marL="0" indent="0">
+              <a:spcBef>
+                <a:spcPts val="360"/>
+              </a:spcBef>
+              <a:spcAft>
+                <a:spcPts val="0"/>
+              </a:spcAft>
+              <a:buFont typeface="Arial" pitchFamily="34" charset="0"/>
+              <a:buNone/>
+            </a:pPr>
+            <a:r>
+              <a:rPr lang="zh-TW" altLang="en-US" sz="1800"/>
+              <a:t>預測結果</a:t>
+            </a:r>
+            <a:r>
+              <a:rPr lang="en-US" altLang="zh-TW" sz="1800"/>
+              <a:t>(</a:t>
+            </a:r>
+            <a:r>
+              <a:rPr lang="zh-TW" altLang="en-US" sz="1800"/>
+              <a:t>布林</a:t>
+            </a:r>
+            <a:r>
+              <a:rPr lang="en-US" altLang="zh-TW" sz="1800"/>
+              <a:t>)</a:t>
+            </a:r>
+            <a:endParaRPr lang="zh-TW" altLang="en-US" sz="1800"/>
+          </a:p>
+        </p:txBody>
+      </p:sp>
+      <p:pic>
+        <p:nvPicPr>
+          <p:cNvPr id="11" name="Google Shape;469;p39">
+            <a:extLst>
+              <a:ext uri="{FF2B5EF4-FFF2-40B4-BE49-F238E27FC236}">
+                <a16:creationId xmlns:a16="http://schemas.microsoft.com/office/drawing/2014/main" id="{E75E704B-1B39-45E2-8C58-3506A8CA14B6}"/>
+              </a:ext>
+            </a:extLst>
+          </p:cNvPr>
+          <p:cNvPicPr preferRelativeResize="0"/>
+          <p:nvPr/>
+        </p:nvPicPr>
+        <p:blipFill>
+          <a:blip r:embed="rId2">
+            <a:alphaModFix/>
+          </a:blip>
+          <a:stretch>
+            <a:fillRect/>
+          </a:stretch>
+        </p:blipFill>
+        <p:spPr>
+          <a:xfrm>
+            <a:off x="448409" y="1603200"/>
+            <a:ext cx="8590726" cy="1673400"/>
+          </a:xfrm>
+          <a:prstGeom prst="rect">
+            <a:avLst/>
+          </a:prstGeom>
+          <a:noFill/>
+          <a:ln>
+            <a:noFill/>
+          </a:ln>
+        </p:spPr>
+      </p:pic>
+      <p:pic>
+        <p:nvPicPr>
+          <p:cNvPr id="12" name="Google Shape;476;p40">
+            <a:extLst>
+              <a:ext uri="{FF2B5EF4-FFF2-40B4-BE49-F238E27FC236}">
+                <a16:creationId xmlns:a16="http://schemas.microsoft.com/office/drawing/2014/main" id="{25326D58-11E3-45C6-A39D-1FE197BE148D}"/>
+              </a:ext>
+            </a:extLst>
+          </p:cNvPr>
+          <p:cNvPicPr preferRelativeResize="0"/>
+          <p:nvPr/>
+        </p:nvPicPr>
+        <p:blipFill>
+          <a:blip r:embed="rId3">
+            <a:alphaModFix/>
+          </a:blip>
+          <a:stretch>
+            <a:fillRect/>
+          </a:stretch>
+        </p:blipFill>
+        <p:spPr>
+          <a:xfrm>
+            <a:off x="5105400" y="3529816"/>
+            <a:ext cx="3803936" cy="2725500"/>
+          </a:xfrm>
+          <a:prstGeom prst="rect">
+            <a:avLst/>
+          </a:prstGeom>
+          <a:noFill/>
+          <a:ln>
+            <a:noFill/>
+          </a:ln>
+        </p:spPr>
+      </p:pic>
+      <p:grpSp>
+        <p:nvGrpSpPr>
+          <p:cNvPr id="13" name="Google Shape;479;p40">
+            <a:extLst>
+              <a:ext uri="{FF2B5EF4-FFF2-40B4-BE49-F238E27FC236}">
+                <a16:creationId xmlns:a16="http://schemas.microsoft.com/office/drawing/2014/main" id="{DC1BF5DE-B7D6-4D94-BA77-795005A4809B}"/>
+              </a:ext>
+            </a:extLst>
+          </p:cNvPr>
+          <p:cNvGrpSpPr/>
+          <p:nvPr/>
+        </p:nvGrpSpPr>
+        <p:grpSpPr>
+          <a:xfrm>
+            <a:off x="304188" y="3529809"/>
+            <a:ext cx="4575299" cy="2898621"/>
+            <a:chOff x="36576" y="1643075"/>
+            <a:chExt cx="4575299" cy="2898621"/>
+          </a:xfrm>
+        </p:grpSpPr>
+        <p:pic>
+          <p:nvPicPr>
+            <p:cNvPr id="14" name="Google Shape;480;p40">
+              <a:extLst>
+                <a:ext uri="{FF2B5EF4-FFF2-40B4-BE49-F238E27FC236}">
+                  <a16:creationId xmlns:a16="http://schemas.microsoft.com/office/drawing/2014/main" id="{48E88B19-464F-4716-A11A-252C1FB9F1B0}"/>
+                </a:ext>
+              </a:extLst>
+            </p:cNvPr>
+            <p:cNvPicPr preferRelativeResize="0"/>
+            <p:nvPr/>
+          </p:nvPicPr>
+          <p:blipFill>
+            <a:blip r:embed="rId4">
+              <a:alphaModFix/>
+            </a:blip>
+            <a:stretch>
+              <a:fillRect/>
+            </a:stretch>
+          </p:blipFill>
+          <p:spPr>
+            <a:xfrm>
+              <a:off x="608025" y="1643075"/>
+              <a:ext cx="4003850" cy="2898621"/>
+            </a:xfrm>
+            <a:prstGeom prst="rect">
+              <a:avLst/>
+            </a:prstGeom>
+            <a:noFill/>
+            <a:ln>
+              <a:noFill/>
+            </a:ln>
+          </p:spPr>
+        </p:pic>
+        <p:sp>
+          <p:nvSpPr>
+            <p:cNvPr id="15" name="Google Shape;481;p40">
+              <a:extLst>
+                <a:ext uri="{FF2B5EF4-FFF2-40B4-BE49-F238E27FC236}">
+                  <a16:creationId xmlns:a16="http://schemas.microsoft.com/office/drawing/2014/main" id="{4B4C7E7C-F3CC-49CD-907B-8F74BDA78B05}"/>
+                </a:ext>
+              </a:extLst>
+            </p:cNvPr>
+            <p:cNvSpPr/>
+            <p:nvPr/>
+          </p:nvSpPr>
+          <p:spPr>
+            <a:xfrm>
+              <a:off x="1865376" y="1925982"/>
+              <a:ext cx="17400" cy="2442600"/>
+            </a:xfrm>
+            <a:prstGeom prst="rect">
+              <a:avLst/>
+            </a:prstGeom>
+            <a:solidFill>
+              <a:srgbClr val="FF0000"/>
+            </a:solidFill>
+            <a:ln>
+              <a:noFill/>
+            </a:ln>
+          </p:spPr>
+          <p:txBody>
+            <a:bodyPr spcFirstLastPara="1" wrap="square" lIns="91425" tIns="91425" rIns="91425" bIns="91425" anchor="ctr" anchorCtr="0">
+              <a:noAutofit/>
+            </a:bodyPr>
+            <a:lstStyle/>
+            <a:p>
+              <a:pPr marL="0" lvl="0" indent="0" algn="l" rtl="0">
+                <a:spcBef>
+                  <a:spcPts val="0"/>
+                </a:spcBef>
+                <a:spcAft>
+                  <a:spcPts val="0"/>
+                </a:spcAft>
+                <a:buNone/>
+              </a:pPr>
+              <a:endParaRPr/>
+            </a:p>
+          </p:txBody>
+        </p:sp>
+        <p:sp>
+          <p:nvSpPr>
+            <p:cNvPr id="16" name="Google Shape;482;p40">
+              <a:extLst>
+                <a:ext uri="{FF2B5EF4-FFF2-40B4-BE49-F238E27FC236}">
+                  <a16:creationId xmlns:a16="http://schemas.microsoft.com/office/drawing/2014/main" id="{7DC51492-8750-4149-A0D8-6310F2D72A7D}"/>
+                </a:ext>
+              </a:extLst>
+            </p:cNvPr>
+            <p:cNvSpPr/>
+            <p:nvPr/>
+          </p:nvSpPr>
+          <p:spPr>
+            <a:xfrm rot="-5400000">
+              <a:off x="1240714" y="1587606"/>
+              <a:ext cx="17700" cy="1435500"/>
+            </a:xfrm>
+            <a:prstGeom prst="rect">
+              <a:avLst/>
+            </a:prstGeom>
+            <a:solidFill>
+              <a:srgbClr val="FF0000"/>
+            </a:solidFill>
+            <a:ln>
+              <a:noFill/>
+            </a:ln>
+          </p:spPr>
+          <p:txBody>
+            <a:bodyPr spcFirstLastPara="1" wrap="square" lIns="91425" tIns="91425" rIns="91425" bIns="91425" anchor="ctr" anchorCtr="0">
+              <a:noAutofit/>
+            </a:bodyPr>
+            <a:lstStyle/>
+            <a:p>
+              <a:pPr marL="0" lvl="0" indent="0" algn="l" rtl="0">
+                <a:spcBef>
+                  <a:spcPts val="0"/>
+                </a:spcBef>
+                <a:spcAft>
+                  <a:spcPts val="0"/>
+                </a:spcAft>
+                <a:buNone/>
+              </a:pPr>
+              <a:endParaRPr/>
+            </a:p>
+          </p:txBody>
+        </p:sp>
+        <p:sp>
+          <p:nvSpPr>
+            <p:cNvPr id="17" name="Google Shape;483;p40">
+              <a:extLst>
+                <a:ext uri="{FF2B5EF4-FFF2-40B4-BE49-F238E27FC236}">
+                  <a16:creationId xmlns:a16="http://schemas.microsoft.com/office/drawing/2014/main" id="{539DDBF6-2421-4595-8A45-F745A4B4B419}"/>
+                </a:ext>
+              </a:extLst>
+            </p:cNvPr>
+            <p:cNvSpPr txBox="1"/>
+            <p:nvPr/>
+          </p:nvSpPr>
+          <p:spPr>
+            <a:xfrm>
+              <a:off x="36576" y="2127504"/>
+              <a:ext cx="582600" cy="342900"/>
+            </a:xfrm>
+            <a:prstGeom prst="rect">
+              <a:avLst/>
+            </a:prstGeom>
+            <a:noFill/>
+            <a:ln>
+              <a:noFill/>
+            </a:ln>
+          </p:spPr>
+          <p:txBody>
+            <a:bodyPr spcFirstLastPara="1" wrap="square" lIns="91425" tIns="91425" rIns="91425" bIns="91425" anchor="ctr" anchorCtr="0">
+              <a:noAutofit/>
+            </a:bodyPr>
+            <a:lstStyle/>
+            <a:p>
+              <a:pPr marL="0" lvl="0" indent="0" algn="ctr" rtl="0">
+                <a:spcBef>
+                  <a:spcPts val="0"/>
+                </a:spcBef>
+                <a:spcAft>
+                  <a:spcPts val="0"/>
+                </a:spcAft>
+                <a:buNone/>
+              </a:pPr>
+              <a:r>
+                <a:rPr lang="en-US" sz="1200">
+                  <a:latin typeface="Microsoft JhengHei"/>
+                  <a:ea typeface="Microsoft JhengHei"/>
+                  <a:cs typeface="Microsoft JhengHei"/>
+                  <a:sym typeface="Microsoft JhengHei"/>
+                </a:rPr>
+                <a:t>0.84</a:t>
+              </a:r>
+              <a:endParaRPr sz="1200">
+                <a:latin typeface="Microsoft JhengHei"/>
+                <a:ea typeface="Microsoft JhengHei"/>
+                <a:cs typeface="Microsoft JhengHei"/>
+                <a:sym typeface="Microsoft JhengHei"/>
+              </a:endParaRPr>
+            </a:p>
+          </p:txBody>
+        </p:sp>
+      </p:grpSp>
+    </p:spTree>
+    <p:extLst>
+      <p:ext uri="{BB962C8B-B14F-4D97-AF65-F5344CB8AC3E}">
+        <p14:creationId xmlns:p14="http://schemas.microsoft.com/office/powerpoint/2010/main" val="3542498266"/>
+      </p:ext>
+    </p:extLst>
+  </p:cSld>
+  <p:clrMapOvr>
+    <a:masterClrMapping/>
+  </p:clrMapOvr>
+</p:sld>
+</file>
+
+<file path=ppt/slides/slide14.xml><?xml version="1.0" encoding="utf-8"?>
+<p:sld xmlns:a="http://schemas.openxmlformats.org/drawingml/2006/main" xmlns:r="http://schemas.openxmlformats.org/officeDocument/2006/relationships" xmlns:p="http://schemas.openxmlformats.org/presentationml/2006/main">
+  <p:cSld>
+    <p:spTree>
+      <p:nvGrpSpPr>
+        <p:cNvPr id="1" name=""/>
+        <p:cNvGrpSpPr/>
+        <p:nvPr/>
+      </p:nvGrpSpPr>
+      <p:grpSpPr>
+        <a:xfrm>
+          <a:off x="0" y="0"/>
+          <a:ext cx="0" cy="0"/>
+          <a:chOff x="0" y="0"/>
+          <a:chExt cx="0" cy="0"/>
+        </a:xfrm>
+      </p:grpSpPr>
+      <p:sp>
+        <p:nvSpPr>
+          <p:cNvPr id="3" name="投影片編號版面配置區 2">
+            <a:extLst>
+              <a:ext uri="{FF2B5EF4-FFF2-40B4-BE49-F238E27FC236}">
                 <a16:creationId xmlns:a16="http://schemas.microsoft.com/office/drawing/2014/main" id="{3CF3FBB4-BC4C-4101-B774-2BF44860C0B0}"/>
               </a:ext>
             </a:extLst>
@@ -6278,7 +7743,7 @@
             <a:fld id="{8F4EACC7-37E3-43A5-A5FB-BEB9CE95D266}" type="slidenum">
               <a:rPr lang="zh-TW" altLang="en-US" smtClean="0"/>
               <a:pPr/>
-              <a:t>11</a:t>
+              <a:t>13</a:t>
             </a:fld>
             <a:endParaRPr lang="zh-TW" altLang="en-US"/>
           </a:p>
@@ -6459,7 +7924,7 @@
 </p:sld>
 </file>
 
-<file path=ppt/slides/slide13.xml><?xml version="1.0" encoding="utf-8"?>
+<file path=ppt/slides/slide15.xml><?xml version="1.0" encoding="utf-8"?>
 <p:sld xmlns:a="http://schemas.openxmlformats.org/drawingml/2006/main" xmlns:r="http://schemas.openxmlformats.org/officeDocument/2006/relationships" xmlns:p="http://schemas.openxmlformats.org/presentationml/2006/main">
   <p:cSld>
     <p:spTree>
@@ -6500,7 +7965,7 @@
             <a:fld id="{8F4EACC7-37E3-43A5-A5FB-BEB9CE95D266}" type="slidenum">
               <a:rPr lang="zh-TW" altLang="en-US" smtClean="0"/>
               <a:pPr/>
-              <a:t>12</a:t>
+              <a:t>14</a:t>
             </a:fld>
             <a:endParaRPr lang="zh-TW" altLang="en-US"/>
           </a:p>
@@ -6912,7 +8377,7 @@
 </p:sld>
 </file>
 
-<file path=ppt/slides/slide14.xml><?xml version="1.0" encoding="utf-8"?>
+<file path=ppt/slides/slide16.xml><?xml version="1.0" encoding="utf-8"?>
 <p:sld xmlns:a="http://schemas.openxmlformats.org/drawingml/2006/main" xmlns:r="http://schemas.openxmlformats.org/officeDocument/2006/relationships" xmlns:p="http://schemas.openxmlformats.org/presentationml/2006/main">
   <p:cSld>
     <p:spTree>
@@ -6953,7 +8418,7 @@
             <a:fld id="{8F4EACC7-37E3-43A5-A5FB-BEB9CE95D266}" type="slidenum">
               <a:rPr lang="zh-TW" altLang="en-US" smtClean="0"/>
               <a:pPr/>
-              <a:t>13</a:t>
+              <a:t>15</a:t>
             </a:fld>
             <a:endParaRPr lang="zh-TW" altLang="en-US"/>
           </a:p>
@@ -7820,491 +9285,6 @@
 </p:sld>
 </file>
 
-<file path=ppt/slides/slide15.xml><?xml version="1.0" encoding="utf-8"?>
-<p:sld xmlns:a="http://schemas.openxmlformats.org/drawingml/2006/main" xmlns:r="http://schemas.openxmlformats.org/officeDocument/2006/relationships" xmlns:p="http://schemas.openxmlformats.org/presentationml/2006/main">
-  <p:cSld>
-    <p:spTree>
-      <p:nvGrpSpPr>
-        <p:cNvPr id="1" name=""/>
-        <p:cNvGrpSpPr/>
-        <p:nvPr/>
-      </p:nvGrpSpPr>
-      <p:grpSpPr>
-        <a:xfrm>
-          <a:off x="0" y="0"/>
-          <a:ext cx="0" cy="0"/>
-          <a:chOff x="0" y="0"/>
-          <a:chExt cx="0" cy="0"/>
-        </a:xfrm>
-      </p:grpSpPr>
-      <p:sp>
-        <p:nvSpPr>
-          <p:cNvPr id="2" name="內容版面配置區 1">
-            <a:extLst>
-              <a:ext uri="{FF2B5EF4-FFF2-40B4-BE49-F238E27FC236}">
-                <a16:creationId xmlns:a16="http://schemas.microsoft.com/office/drawing/2014/main" id="{FB6F9911-A672-4342-84A4-EC6B03013538}"/>
-              </a:ext>
-            </a:extLst>
-          </p:cNvPr>
-          <p:cNvSpPr>
-            <a:spLocks noGrp="1"/>
-          </p:cNvSpPr>
-          <p:nvPr>
-            <p:ph idx="1"/>
-          </p:nvPr>
-        </p:nvSpPr>
-        <p:spPr/>
-        <p:txBody>
-          <a:bodyPr>
-            <a:normAutofit fontScale="85000" lnSpcReduction="20000"/>
-          </a:bodyPr>
-          <a:lstStyle/>
-          <a:p>
-            <a:r>
-              <a:rPr lang="en-US" dirty="0"/>
-              <a:t>Data Cleaning(</a:t>
-            </a:r>
-            <a:r>
-              <a:rPr lang="zh-TW" altLang="en-US" dirty="0"/>
-              <a:t>資料清理</a:t>
-            </a:r>
-            <a:r>
-              <a:rPr lang="en-US" altLang="zh-TW" dirty="0"/>
-              <a:t>)</a:t>
-            </a:r>
-          </a:p>
-          <a:p>
-            <a:pPr lvl="1"/>
-            <a:r>
-              <a:rPr lang="en-US" dirty="0"/>
-              <a:t>Fill in missing values(</a:t>
-            </a:r>
-            <a:r>
-              <a:rPr lang="zh-TW" altLang="en-US" dirty="0"/>
-              <a:t>填入遺漏值</a:t>
-            </a:r>
-            <a:r>
-              <a:rPr lang="en-US" altLang="zh-TW" dirty="0"/>
-              <a:t>)</a:t>
-            </a:r>
-          </a:p>
-          <a:p>
-            <a:pPr lvl="1"/>
-            <a:r>
-              <a:rPr lang="en-US" dirty="0"/>
-              <a:t>Identify or remove outliers(</a:t>
-            </a:r>
-            <a:r>
-              <a:rPr lang="zh-TW" altLang="en-US" dirty="0"/>
-              <a:t>辨識並移除離群值</a:t>
-            </a:r>
-            <a:r>
-              <a:rPr lang="en-US" altLang="zh-TW" dirty="0"/>
-              <a:t>)</a:t>
-            </a:r>
-          </a:p>
-          <a:p>
-            <a:pPr lvl="1"/>
-            <a:r>
-              <a:rPr lang="en-US" dirty="0"/>
-              <a:t>Resolve inconsistencies(</a:t>
-            </a:r>
-            <a:r>
-              <a:rPr lang="zh-TW" altLang="en-US" dirty="0"/>
-              <a:t>資料不一致</a:t>
-            </a:r>
-            <a:r>
-              <a:rPr lang="en-US" altLang="zh-TW" dirty="0"/>
-              <a:t>)</a:t>
-            </a:r>
-          </a:p>
-          <a:p>
-            <a:r>
-              <a:rPr lang="en-US" dirty="0"/>
-              <a:t>Integration(</a:t>
-            </a:r>
-            <a:r>
-              <a:rPr lang="zh-TW" altLang="en-US" dirty="0"/>
-              <a:t>資料整合</a:t>
-            </a:r>
-            <a:r>
-              <a:rPr lang="en-US" altLang="zh-TW" dirty="0"/>
-              <a:t>)</a:t>
-            </a:r>
-          </a:p>
-          <a:p>
-            <a:pPr lvl="1"/>
-            <a:r>
-              <a:rPr lang="en-US" dirty="0"/>
-              <a:t>Join tables</a:t>
-            </a:r>
-          </a:p>
-          <a:p>
-            <a:pPr lvl="1"/>
-            <a:r>
-              <a:rPr lang="en-US" dirty="0"/>
-              <a:t>Different data sources: csv, json, xml, html, </a:t>
-            </a:r>
-            <a:r>
-              <a:rPr lang="en-US" dirty="0" err="1"/>
-              <a:t>api</a:t>
-            </a:r>
-            <a:r>
-              <a:rPr lang="en-US" dirty="0"/>
-              <a:t>, </a:t>
-            </a:r>
-            <a:r>
-              <a:rPr lang="en-US" dirty="0" err="1"/>
-              <a:t>datebases</a:t>
-            </a:r>
-            <a:endParaRPr lang="en-US" dirty="0"/>
-          </a:p>
-          <a:p>
-            <a:r>
-              <a:rPr lang="en-US" dirty="0"/>
-              <a:t>Transformation(</a:t>
-            </a:r>
-            <a:r>
-              <a:rPr lang="zh-TW" altLang="en-US" dirty="0"/>
-              <a:t>資料轉換</a:t>
-            </a:r>
-            <a:r>
-              <a:rPr lang="en-US" altLang="zh-TW" dirty="0"/>
-              <a:t>)</a:t>
-            </a:r>
-          </a:p>
-          <a:p>
-            <a:pPr lvl="1"/>
-            <a:r>
-              <a:rPr lang="en-US" dirty="0"/>
-              <a:t>Normalization(</a:t>
-            </a:r>
-            <a:r>
-              <a:rPr lang="zh-TW" altLang="en-US" dirty="0"/>
-              <a:t>正規化</a:t>
-            </a:r>
-            <a:r>
-              <a:rPr lang="en-US" altLang="zh-TW" dirty="0"/>
-              <a:t>)</a:t>
-            </a:r>
-          </a:p>
-          <a:p>
-            <a:pPr lvl="1"/>
-            <a:r>
-              <a:rPr lang="en-US" dirty="0"/>
-              <a:t>Aggregation(</a:t>
-            </a:r>
-            <a:r>
-              <a:rPr lang="zh-TW" altLang="en-US" dirty="0"/>
-              <a:t>加總</a:t>
-            </a:r>
-            <a:r>
-              <a:rPr lang="en-US" altLang="zh-TW" dirty="0"/>
-              <a:t>)</a:t>
-            </a:r>
-          </a:p>
-          <a:p>
-            <a:pPr lvl="1"/>
-            <a:r>
-              <a:rPr lang="en-US" dirty="0"/>
-              <a:t>Feature Engineering(</a:t>
-            </a:r>
-            <a:r>
-              <a:rPr lang="zh-TW" altLang="en-US" dirty="0"/>
-              <a:t>特徵值篩選</a:t>
-            </a:r>
-            <a:r>
-              <a:rPr lang="en-US" altLang="zh-TW" dirty="0"/>
-              <a:t>)</a:t>
-            </a:r>
-          </a:p>
-          <a:p>
-            <a:r>
-              <a:rPr lang="en-US" dirty="0"/>
-              <a:t>Data discretization(</a:t>
-            </a:r>
-            <a:r>
-              <a:rPr lang="zh-TW" altLang="en-US" dirty="0"/>
-              <a:t>資料切片</a:t>
-            </a:r>
-            <a:r>
-              <a:rPr lang="en-US" altLang="zh-TW" dirty="0"/>
-              <a:t>)</a:t>
-            </a:r>
-          </a:p>
-          <a:p>
-            <a:pPr lvl="1"/>
-            <a:r>
-              <a:rPr lang="en-US" dirty="0"/>
-              <a:t>data reduction(</a:t>
-            </a:r>
-            <a:r>
-              <a:rPr lang="zh-TW" altLang="en-US" dirty="0"/>
-              <a:t>降維</a:t>
-            </a:r>
-            <a:r>
-              <a:rPr lang="en-US" altLang="zh-TW" dirty="0"/>
-              <a:t>)</a:t>
-            </a:r>
-            <a:endParaRPr lang="en-US" dirty="0"/>
-          </a:p>
-        </p:txBody>
-      </p:sp>
-      <p:sp>
-        <p:nvSpPr>
-          <p:cNvPr id="3" name="投影片編號版面配置區 2">
-            <a:extLst>
-              <a:ext uri="{FF2B5EF4-FFF2-40B4-BE49-F238E27FC236}">
-                <a16:creationId xmlns:a16="http://schemas.microsoft.com/office/drawing/2014/main" id="{C98A4689-5811-47DE-9CC8-72B66DE44212}"/>
-              </a:ext>
-            </a:extLst>
-          </p:cNvPr>
-          <p:cNvSpPr>
-            <a:spLocks noGrp="1"/>
-          </p:cNvSpPr>
-          <p:nvPr>
-            <p:ph type="sldNum" sz="quarter" idx="12"/>
-          </p:nvPr>
-        </p:nvSpPr>
-        <p:spPr/>
-        <p:txBody>
-          <a:bodyPr/>
-          <a:lstStyle/>
-          <a:p>
-            <a:fld id="{8F4EACC7-37E3-43A5-A5FB-BEB9CE95D266}" type="slidenum">
-              <a:rPr lang="zh-TW" altLang="en-US" smtClean="0"/>
-              <a:pPr/>
-              <a:t>14</a:t>
-            </a:fld>
-            <a:endParaRPr lang="zh-TW" altLang="en-US"/>
-          </a:p>
-        </p:txBody>
-      </p:sp>
-      <p:sp>
-        <p:nvSpPr>
-          <p:cNvPr id="4" name="標題 3">
-            <a:extLst>
-              <a:ext uri="{FF2B5EF4-FFF2-40B4-BE49-F238E27FC236}">
-                <a16:creationId xmlns:a16="http://schemas.microsoft.com/office/drawing/2014/main" id="{1DABDE42-3038-4569-B558-703CE076CC94}"/>
-              </a:ext>
-            </a:extLst>
-          </p:cNvPr>
-          <p:cNvSpPr>
-            <a:spLocks noGrp="1"/>
-          </p:cNvSpPr>
-          <p:nvPr>
-            <p:ph type="title"/>
-          </p:nvPr>
-        </p:nvSpPr>
-        <p:spPr/>
-        <p:txBody>
-          <a:bodyPr/>
-          <a:lstStyle/>
-          <a:p>
-            <a:r>
-              <a:rPr lang="en-US" dirty="0"/>
-              <a:t>Pre-Processing</a:t>
-            </a:r>
-          </a:p>
-        </p:txBody>
-      </p:sp>
-    </p:spTree>
-    <p:extLst>
-      <p:ext uri="{BB962C8B-B14F-4D97-AF65-F5344CB8AC3E}">
-        <p14:creationId xmlns:p14="http://schemas.microsoft.com/office/powerpoint/2010/main" val="2015132224"/>
-      </p:ext>
-    </p:extLst>
-  </p:cSld>
-  <p:clrMapOvr>
-    <a:masterClrMapping/>
-  </p:clrMapOvr>
-</p:sld>
-</file>
-
-<file path=ppt/slides/slide16.xml><?xml version="1.0" encoding="utf-8"?>
-<p:sld xmlns:a="http://schemas.openxmlformats.org/drawingml/2006/main" xmlns:r="http://schemas.openxmlformats.org/officeDocument/2006/relationships" xmlns:p="http://schemas.openxmlformats.org/presentationml/2006/main">
-  <p:cSld>
-    <p:spTree>
-      <p:nvGrpSpPr>
-        <p:cNvPr id="1" name=""/>
-        <p:cNvGrpSpPr/>
-        <p:nvPr/>
-      </p:nvGrpSpPr>
-      <p:grpSpPr>
-        <a:xfrm>
-          <a:off x="0" y="0"/>
-          <a:ext cx="0" cy="0"/>
-          <a:chOff x="0" y="0"/>
-          <a:chExt cx="0" cy="0"/>
-        </a:xfrm>
-      </p:grpSpPr>
-      <p:sp>
-        <p:nvSpPr>
-          <p:cNvPr id="2" name="內容版面配置區 1">
-            <a:extLst>
-              <a:ext uri="{FF2B5EF4-FFF2-40B4-BE49-F238E27FC236}">
-                <a16:creationId xmlns:a16="http://schemas.microsoft.com/office/drawing/2014/main" id="{D7776256-E407-4CB9-8746-467118CF0D41}"/>
-              </a:ext>
-            </a:extLst>
-          </p:cNvPr>
-          <p:cNvSpPr>
-            <a:spLocks noGrp="1"/>
-          </p:cNvSpPr>
-          <p:nvPr>
-            <p:ph idx="1"/>
-          </p:nvPr>
-        </p:nvSpPr>
-        <p:spPr/>
-        <p:txBody>
-          <a:bodyPr>
-            <a:normAutofit/>
-          </a:bodyPr>
-          <a:lstStyle/>
-          <a:p>
-            <a:r>
-              <a:rPr lang="en-US" dirty="0"/>
-              <a:t>AI Framework</a:t>
-            </a:r>
-          </a:p>
-          <a:p>
-            <a:pPr lvl="1"/>
-            <a:r>
-              <a:rPr lang="en-US" dirty="0"/>
-              <a:t>ML: </a:t>
-            </a:r>
-            <a:r>
-              <a:rPr lang="en-US" dirty="0" err="1"/>
-              <a:t>scikit</a:t>
-            </a:r>
-            <a:r>
-              <a:rPr lang="en-US" dirty="0"/>
-              <a:t>-learn</a:t>
-            </a:r>
-          </a:p>
-          <a:p>
-            <a:pPr lvl="1"/>
-            <a:r>
-              <a:rPr lang="en-US" dirty="0"/>
-              <a:t>DL: </a:t>
-            </a:r>
-            <a:r>
-              <a:rPr lang="en-US" dirty="0" err="1"/>
-              <a:t>Tensorflow</a:t>
-            </a:r>
-            <a:r>
-              <a:rPr lang="en-US" dirty="0"/>
-              <a:t>, </a:t>
-            </a:r>
-            <a:r>
-              <a:rPr lang="en-US" dirty="0" err="1"/>
-              <a:t>Keras</a:t>
-            </a:r>
-            <a:r>
-              <a:rPr lang="en-US" dirty="0"/>
-              <a:t>, </a:t>
-            </a:r>
-            <a:r>
-              <a:rPr lang="en-US" dirty="0" err="1"/>
-              <a:t>PyTorch</a:t>
-            </a:r>
-            <a:r>
-              <a:rPr lang="en-US" dirty="0"/>
-              <a:t>, Caffe</a:t>
-            </a:r>
-          </a:p>
-          <a:p>
-            <a:r>
-              <a:rPr lang="en-US" dirty="0"/>
-              <a:t>Hyper Parameters</a:t>
-            </a:r>
-          </a:p>
-          <a:p>
-            <a:pPr lvl="1"/>
-            <a:r>
-              <a:rPr lang="en-US" dirty="0"/>
-              <a:t>Input Variables </a:t>
-            </a:r>
-          </a:p>
-          <a:p>
-            <a:pPr lvl="1"/>
-            <a:r>
-              <a:rPr lang="en-US" dirty="0"/>
-              <a:t>Number of Layers</a:t>
-            </a:r>
-          </a:p>
-        </p:txBody>
-      </p:sp>
-      <p:sp>
-        <p:nvSpPr>
-          <p:cNvPr id="3" name="投影片編號版面配置區 2">
-            <a:extLst>
-              <a:ext uri="{FF2B5EF4-FFF2-40B4-BE49-F238E27FC236}">
-                <a16:creationId xmlns:a16="http://schemas.microsoft.com/office/drawing/2014/main" id="{928E6B69-8259-4276-ACC3-1F1CEFA4606A}"/>
-              </a:ext>
-            </a:extLst>
-          </p:cNvPr>
-          <p:cNvSpPr>
-            <a:spLocks noGrp="1"/>
-          </p:cNvSpPr>
-          <p:nvPr>
-            <p:ph type="sldNum" sz="quarter" idx="12"/>
-          </p:nvPr>
-        </p:nvSpPr>
-        <p:spPr/>
-        <p:txBody>
-          <a:bodyPr/>
-          <a:lstStyle/>
-          <a:p>
-            <a:fld id="{8F4EACC7-37E3-43A5-A5FB-BEB9CE95D266}" type="slidenum">
-              <a:rPr lang="zh-TW" altLang="en-US" smtClean="0"/>
-              <a:pPr/>
-              <a:t>15</a:t>
-            </a:fld>
-            <a:endParaRPr lang="zh-TW" altLang="en-US"/>
-          </a:p>
-        </p:txBody>
-      </p:sp>
-      <p:sp>
-        <p:nvSpPr>
-          <p:cNvPr id="4" name="標題 3">
-            <a:extLst>
-              <a:ext uri="{FF2B5EF4-FFF2-40B4-BE49-F238E27FC236}">
-                <a16:creationId xmlns:a16="http://schemas.microsoft.com/office/drawing/2014/main" id="{AB7013AE-5B56-4D15-88A6-1B71BA79B180}"/>
-              </a:ext>
-            </a:extLst>
-          </p:cNvPr>
-          <p:cNvSpPr>
-            <a:spLocks noGrp="1"/>
-          </p:cNvSpPr>
-          <p:nvPr>
-            <p:ph type="title"/>
-          </p:nvPr>
-        </p:nvSpPr>
-        <p:spPr/>
-        <p:txBody>
-          <a:bodyPr/>
-          <a:lstStyle/>
-          <a:p>
-            <a:r>
-              <a:rPr lang="en-US" dirty="0"/>
-              <a:t>Model Building</a:t>
-            </a:r>
-          </a:p>
-        </p:txBody>
-      </p:sp>
-    </p:spTree>
-    <p:extLst>
-      <p:ext uri="{BB962C8B-B14F-4D97-AF65-F5344CB8AC3E}">
-        <p14:creationId xmlns:p14="http://schemas.microsoft.com/office/powerpoint/2010/main" val="1869225185"/>
-      </p:ext>
-    </p:extLst>
-  </p:cSld>
-  <p:clrMapOvr>
-    <a:masterClrMapping/>
-  </p:clrMapOvr>
-</p:sld>
-</file>
-
 <file path=ppt/slides/slide17.xml><?xml version="1.0" encoding="utf-8"?>
 <p:sld xmlns:a="http://schemas.openxmlformats.org/drawingml/2006/main" xmlns:r="http://schemas.openxmlformats.org/officeDocument/2006/relationships" xmlns:p="http://schemas.openxmlformats.org/presentationml/2006/main">
   <p:cSld>
@@ -8327,7 +9307,7 @@
           <p:cNvPr id="2" name="內容版面配置區 1">
             <a:extLst>
               <a:ext uri="{FF2B5EF4-FFF2-40B4-BE49-F238E27FC236}">
-                <a16:creationId xmlns:a16="http://schemas.microsoft.com/office/drawing/2014/main" id="{D7776256-E407-4CB9-8746-467118CF0D41}"/>
+                <a16:creationId xmlns:a16="http://schemas.microsoft.com/office/drawing/2014/main" id="{FB6F9911-A672-4342-84A4-EC6B03013538}"/>
               </a:ext>
             </a:extLst>
           </p:cNvPr>
@@ -8341,92 +9321,197 @@
         <p:spPr/>
         <p:txBody>
           <a:bodyPr>
-            <a:normAutofit lnSpcReduction="10000"/>
+            <a:normAutofit fontScale="85000" lnSpcReduction="20000"/>
           </a:bodyPr>
           <a:lstStyle/>
           <a:p>
             <a:r>
               <a:rPr lang="en-US" dirty="0"/>
-              <a:t>Random Forest:</a:t>
+              <a:t>Data Cleaning(</a:t>
+            </a:r>
+            <a:r>
+              <a:rPr lang="zh-TW" altLang="en-US" dirty="0"/>
+              <a:t>資料清理</a:t>
+            </a:r>
+            <a:r>
+              <a:rPr lang="en-US" altLang="zh-TW" dirty="0"/>
+              <a:t>)</a:t>
             </a:r>
           </a:p>
           <a:p>
             <a:pPr lvl="1"/>
             <a:r>
               <a:rPr lang="en-US" dirty="0"/>
-              <a:t>Learning Rate</a:t>
+              <a:t>Fill in missing values(</a:t>
+            </a:r>
+            <a:r>
+              <a:rPr lang="zh-TW" altLang="en-US" dirty="0"/>
+              <a:t>填入遺漏值</a:t>
+            </a:r>
+            <a:r>
+              <a:rPr lang="en-US" altLang="zh-TW" dirty="0"/>
+              <a:t>)</a:t>
             </a:r>
           </a:p>
           <a:p>
             <a:pPr lvl="1"/>
             <a:r>
               <a:rPr lang="en-US" dirty="0"/>
-              <a:t>Objective Function</a:t>
+              <a:t>Identify or remove outliers(</a:t>
+            </a:r>
+            <a:r>
+              <a:rPr lang="zh-TW" altLang="en-US" dirty="0"/>
+              <a:t>辨識並移除離群值</a:t>
+            </a:r>
+            <a:r>
+              <a:rPr lang="en-US" altLang="zh-TW" dirty="0"/>
+              <a:t>)</a:t>
             </a:r>
           </a:p>
           <a:p>
             <a:pPr lvl="1"/>
             <a:r>
               <a:rPr lang="en-US" dirty="0"/>
-              <a:t>Max </a:t>
+              <a:t>Resolve inconsistencies(</a:t>
+            </a:r>
+            <a:r>
+              <a:rPr lang="zh-TW" altLang="en-US" dirty="0"/>
+              <a:t>資料不一致</a:t>
             </a:r>
             <a:r>
               <a:rPr lang="en-US" altLang="zh-TW" dirty="0"/>
-              <a:t>D</a:t>
-            </a:r>
+              <a:t>)</a:t>
+            </a:r>
+          </a:p>
+          <a:p>
             <a:r>
               <a:rPr lang="en-US" dirty="0"/>
-              <a:t>epth</a:t>
+              <a:t>Integration(</a:t>
+            </a:r>
+            <a:r>
+              <a:rPr lang="zh-TW" altLang="en-US" dirty="0"/>
+              <a:t>資料整合</a:t>
+            </a:r>
+            <a:r>
+              <a:rPr lang="en-US" altLang="zh-TW" dirty="0"/>
+              <a:t>)</a:t>
             </a:r>
           </a:p>
           <a:p>
             <a:pPr lvl="1"/>
             <a:r>
               <a:rPr lang="en-US" dirty="0"/>
-              <a:t>…</a:t>
-            </a:r>
-          </a:p>
-          <a:p>
+              <a:t>Join tables</a:t>
+            </a:r>
+          </a:p>
+          <a:p>
+            <a:pPr lvl="1"/>
             <a:r>
               <a:rPr lang="en-US" dirty="0"/>
-              <a:t>Deep Learning:</a:t>
+              <a:t>Different data sources: csv, json, xml, html, </a:t>
+            </a:r>
+            <a:r>
+              <a:rPr lang="en-US" dirty="0" err="1"/>
+              <a:t>api</a:t>
+            </a:r>
+            <a:r>
+              <a:rPr lang="en-US" dirty="0"/>
+              <a:t>, </a:t>
+            </a:r>
+            <a:r>
+              <a:rPr lang="en-US" dirty="0" err="1"/>
+              <a:t>datebases</a:t>
+            </a:r>
+            <a:endParaRPr lang="en-US" dirty="0"/>
+          </a:p>
+          <a:p>
+            <a:r>
+              <a:rPr lang="en-US" dirty="0"/>
+              <a:t>Transformation(</a:t>
+            </a:r>
+            <a:r>
+              <a:rPr lang="zh-TW" altLang="en-US" dirty="0"/>
+              <a:t>資料轉換</a:t>
+            </a:r>
+            <a:r>
+              <a:rPr lang="en-US" altLang="zh-TW" dirty="0"/>
+              <a:t>)</a:t>
             </a:r>
           </a:p>
           <a:p>
             <a:pPr lvl="1"/>
             <a:r>
               <a:rPr lang="en-US" dirty="0"/>
-              <a:t>Learning Rate</a:t>
+              <a:t>Normalization(</a:t>
+            </a:r>
+            <a:r>
+              <a:rPr lang="zh-TW" altLang="en-US" dirty="0"/>
+              <a:t>正規化</a:t>
+            </a:r>
+            <a:r>
+              <a:rPr lang="en-US" altLang="zh-TW" dirty="0"/>
+              <a:t>)</a:t>
             </a:r>
           </a:p>
           <a:p>
             <a:pPr lvl="1"/>
             <a:r>
               <a:rPr lang="en-US" dirty="0"/>
-              <a:t>Loss Function</a:t>
+              <a:t>Aggregation(</a:t>
+            </a:r>
+            <a:r>
+              <a:rPr lang="zh-TW" altLang="en-US" dirty="0"/>
+              <a:t>加總</a:t>
+            </a:r>
+            <a:r>
+              <a:rPr lang="en-US" altLang="zh-TW" dirty="0"/>
+              <a:t>)</a:t>
             </a:r>
           </a:p>
           <a:p>
             <a:pPr lvl="1"/>
             <a:r>
               <a:rPr lang="en-US" dirty="0"/>
-              <a:t>Optimizer</a:t>
+              <a:t>Feature Engineering(</a:t>
+            </a:r>
+            <a:r>
+              <a:rPr lang="zh-TW" altLang="en-US" dirty="0"/>
+              <a:t>特徵值篩選</a:t>
+            </a:r>
+            <a:r>
+              <a:rPr lang="en-US" altLang="zh-TW" dirty="0"/>
+              <a:t>)</a:t>
+            </a:r>
+          </a:p>
+          <a:p>
+            <a:r>
+              <a:rPr lang="en-US" dirty="0"/>
+              <a:t>Data discretization(</a:t>
+            </a:r>
+            <a:r>
+              <a:rPr lang="zh-TW" altLang="en-US" dirty="0"/>
+              <a:t>資料切片</a:t>
+            </a:r>
+            <a:r>
+              <a:rPr lang="en-US" altLang="zh-TW" dirty="0"/>
+              <a:t>)</a:t>
             </a:r>
           </a:p>
           <a:p>
             <a:pPr lvl="1"/>
             <a:r>
-              <a:rPr lang="en-US" dirty="0" err="1"/>
-              <a:t>Iterrations</a:t>
+              <a:rPr lang="en-US" dirty="0"/>
+              <a:t>data reduction(</a:t>
+            </a:r>
+            <a:r>
+              <a:rPr lang="zh-TW" altLang="en-US" dirty="0"/>
+              <a:t>降維</a:t>
+            </a:r>
+            <a:r>
+              <a:rPr lang="en-US" altLang="zh-TW" dirty="0"/>
+              <a:t>)</a:t>
             </a:r>
             <a:endParaRPr lang="en-US" dirty="0"/>
-          </a:p>
-          <a:p>
-            <a:pPr lvl="1"/>
-            <a:r>
-              <a:rPr lang="en-US" dirty="0"/>
-              <a:t>…</a:t>
-            </a:r>
           </a:p>
         </p:txBody>
       </p:sp>
@@ -8435,7 +9520,7 @@
           <p:cNvPr id="3" name="投影片編號版面配置區 2">
             <a:extLst>
               <a:ext uri="{FF2B5EF4-FFF2-40B4-BE49-F238E27FC236}">
-                <a16:creationId xmlns:a16="http://schemas.microsoft.com/office/drawing/2014/main" id="{928E6B69-8259-4276-ACC3-1F1CEFA4606A}"/>
+                <a16:creationId xmlns:a16="http://schemas.microsoft.com/office/drawing/2014/main" id="{C98A4689-5811-47DE-9CC8-72B66DE44212}"/>
               </a:ext>
             </a:extLst>
           </p:cNvPr>
@@ -8465,7 +9550,7 @@
           <p:cNvPr id="4" name="標題 3">
             <a:extLst>
               <a:ext uri="{FF2B5EF4-FFF2-40B4-BE49-F238E27FC236}">
-                <a16:creationId xmlns:a16="http://schemas.microsoft.com/office/drawing/2014/main" id="{AB7013AE-5B56-4D15-88A6-1B71BA79B180}"/>
+                <a16:creationId xmlns:a16="http://schemas.microsoft.com/office/drawing/2014/main" id="{1DABDE42-3038-4569-B558-703CE076CC94}"/>
               </a:ext>
             </a:extLst>
           </p:cNvPr>
@@ -8482,21 +9567,16 @@
           <a:lstStyle/>
           <a:p>
             <a:r>
-              <a:rPr lang="en-US" altLang="zh-TW" dirty="0">
-                <a:solidFill>
-                  <a:schemeClr val="bg1"/>
-                </a:solidFill>
-              </a:rPr>
-              <a:t>Parameter Tuning</a:t>
-            </a:r>
-            <a:endParaRPr lang="en-US" dirty="0"/>
+              <a:rPr lang="en-US" dirty="0"/>
+              <a:t>Pre-Processing</a:t>
+            </a:r>
           </a:p>
         </p:txBody>
       </p:sp>
     </p:spTree>
     <p:extLst>
       <p:ext uri="{BB962C8B-B14F-4D97-AF65-F5344CB8AC3E}">
-        <p14:creationId xmlns:p14="http://schemas.microsoft.com/office/powerpoint/2010/main" val="3601684888"/>
+        <p14:creationId xmlns:p14="http://schemas.microsoft.com/office/powerpoint/2010/main" val="2015132224"/>
       </p:ext>
     </p:extLst>
   </p:cSld>
@@ -8528,7 +9608,7 @@
           <p:cNvPr id="2" name="內容版面配置區 1">
             <a:extLst>
               <a:ext uri="{FF2B5EF4-FFF2-40B4-BE49-F238E27FC236}">
-                <a16:creationId xmlns:a16="http://schemas.microsoft.com/office/drawing/2014/main" id="{4D308327-A129-48EE-94EF-6B74666B2744}"/>
+                <a16:creationId xmlns:a16="http://schemas.microsoft.com/office/drawing/2014/main" id="{D7776256-E407-4CB9-8746-467118CF0D41}"/>
               </a:ext>
             </a:extLst>
           </p:cNvPr>
@@ -8539,12 +9619,7 @@
             <p:ph idx="1"/>
           </p:nvPr>
         </p:nvSpPr>
-        <p:spPr>
-          <a:xfrm>
-            <a:off x="272480" y="764704"/>
-            <a:ext cx="4680520" cy="5616624"/>
-          </a:xfrm>
-        </p:spPr>
+        <p:spPr/>
         <p:txBody>
           <a:bodyPr>
             <a:normAutofit/>
@@ -8552,72 +9627,74 @@
           <a:lstStyle/>
           <a:p>
             <a:r>
-              <a:rPr lang="en-US" altLang="zh-TW" dirty="0"/>
-              <a:t>Specification: </a:t>
+              <a:rPr lang="en-US" dirty="0"/>
+              <a:t>AI Framework</a:t>
             </a:r>
           </a:p>
           <a:p>
             <a:pPr lvl="1"/>
             <a:r>
-              <a:rPr lang="en-US" altLang="zh-TW" b="0" dirty="0"/>
-              <a:t>CPU</a:t>
+              <a:rPr lang="en-US" dirty="0"/>
+              <a:t>ML: </a:t>
+            </a:r>
+            <a:r>
+              <a:rPr lang="en-US" dirty="0" err="1"/>
+              <a:t>scikit</a:t>
+            </a:r>
+            <a:r>
+              <a:rPr lang="en-US" dirty="0"/>
+              <a:t>-learn</a:t>
             </a:r>
           </a:p>
           <a:p>
             <a:pPr lvl="1"/>
             <a:r>
-              <a:rPr lang="en-US" altLang="zh-TW" b="0" dirty="0"/>
-              <a:t>GPU</a:t>
+              <a:rPr lang="en-US" dirty="0"/>
+              <a:t>DL: </a:t>
+            </a:r>
+            <a:r>
+              <a:rPr lang="en-US" dirty="0" err="1"/>
+              <a:t>Tensorflow</a:t>
+            </a:r>
+            <a:r>
+              <a:rPr lang="en-US" dirty="0"/>
+              <a:t>, </a:t>
+            </a:r>
+            <a:r>
+              <a:rPr lang="en-US" dirty="0" err="1"/>
+              <a:t>Keras</a:t>
+            </a:r>
+            <a:r>
+              <a:rPr lang="en-US" dirty="0"/>
+              <a:t>, </a:t>
+            </a:r>
+            <a:r>
+              <a:rPr lang="en-US" dirty="0" err="1"/>
+              <a:t>PyTorch</a:t>
+            </a:r>
+            <a:r>
+              <a:rPr lang="en-US" dirty="0"/>
+              <a:t>, Caffe</a:t>
+            </a:r>
+          </a:p>
+          <a:p>
+            <a:r>
+              <a:rPr lang="en-US" dirty="0"/>
+              <a:t>Hyper Parameters</a:t>
             </a:r>
           </a:p>
           <a:p>
             <a:pPr lvl="1"/>
             <a:r>
-              <a:rPr lang="en-US" altLang="zh-TW" b="0" dirty="0"/>
-              <a:t>Memory</a:t>
-            </a:r>
-          </a:p>
-          <a:p>
-            <a:r>
-              <a:rPr lang="en-US" altLang="zh-TW" dirty="0"/>
-              <a:t>Device: </a:t>
+              <a:rPr lang="en-US" dirty="0"/>
+              <a:t>Input Variables </a:t>
             </a:r>
           </a:p>
           <a:p>
             <a:pPr lvl="1"/>
             <a:r>
-              <a:rPr lang="en-US" altLang="zh-TW" b="0" dirty="0"/>
-              <a:t>Computer</a:t>
-            </a:r>
-          </a:p>
-          <a:p>
-            <a:pPr lvl="1"/>
-            <a:r>
-              <a:rPr lang="en-US" altLang="zh-TW" b="0" dirty="0"/>
-              <a:t>Smart Phone</a:t>
-            </a:r>
-          </a:p>
-          <a:p>
-            <a:pPr lvl="1"/>
-            <a:r>
-              <a:rPr lang="en-US" b="0" dirty="0"/>
-              <a:t>Development Board (</a:t>
-            </a:r>
-            <a:r>
-              <a:rPr lang="en-US" b="0" dirty="0" err="1"/>
-              <a:t>RaspberryPi</a:t>
-            </a:r>
-            <a:r>
-              <a:rPr lang="en-US" b="0" dirty="0"/>
-              <a:t> or </a:t>
-            </a:r>
-            <a:r>
-              <a:rPr lang="en-US" b="0" dirty="0" err="1"/>
-              <a:t>JetsonNano</a:t>
-            </a:r>
-            <a:r>
-              <a:rPr lang="en-US" b="0" dirty="0"/>
-              <a:t>)</a:t>
+              <a:rPr lang="en-US" dirty="0"/>
+              <a:t>Number of Layers</a:t>
             </a:r>
           </a:p>
         </p:txBody>
@@ -8627,7 +9704,7 @@
           <p:cNvPr id="3" name="投影片編號版面配置區 2">
             <a:extLst>
               <a:ext uri="{FF2B5EF4-FFF2-40B4-BE49-F238E27FC236}">
-                <a16:creationId xmlns:a16="http://schemas.microsoft.com/office/drawing/2014/main" id="{82ED3DEA-7008-450C-815A-CD20FE52C48E}"/>
+                <a16:creationId xmlns:a16="http://schemas.microsoft.com/office/drawing/2014/main" id="{928E6B69-8259-4276-ACC3-1F1CEFA4606A}"/>
               </a:ext>
             </a:extLst>
           </p:cNvPr>
@@ -8657,7 +9734,7 @@
           <p:cNvPr id="4" name="標題 3">
             <a:extLst>
               <a:ext uri="{FF2B5EF4-FFF2-40B4-BE49-F238E27FC236}">
-                <a16:creationId xmlns:a16="http://schemas.microsoft.com/office/drawing/2014/main" id="{1C0CCDEF-5627-4478-B61F-8D82400D252C}"/>
+                <a16:creationId xmlns:a16="http://schemas.microsoft.com/office/drawing/2014/main" id="{AB7013AE-5B56-4D15-88A6-1B71BA79B180}"/>
               </a:ext>
             </a:extLst>
           </p:cNvPr>
@@ -8674,288 +9751,8 @@
           <a:lstStyle/>
           <a:p>
             <a:r>
-              <a:rPr lang="en-US" altLang="zh-TW" dirty="0"/>
-              <a:t>D</a:t>
-            </a:r>
-            <a:r>
               <a:rPr lang="en-US" dirty="0"/>
-              <a:t>eployment</a:t>
-            </a:r>
-          </a:p>
-        </p:txBody>
-      </p:sp>
-      <p:sp>
-        <p:nvSpPr>
-          <p:cNvPr id="6" name="內容版面配置區 1">
-            <a:extLst>
-              <a:ext uri="{FF2B5EF4-FFF2-40B4-BE49-F238E27FC236}">
-                <a16:creationId xmlns:a16="http://schemas.microsoft.com/office/drawing/2014/main" id="{A08D7970-9E63-4BD5-B0D6-8AD1FED4BB9C}"/>
-              </a:ext>
-            </a:extLst>
-          </p:cNvPr>
-          <p:cNvSpPr txBox="1">
-            <a:spLocks/>
-          </p:cNvSpPr>
-          <p:nvPr/>
-        </p:nvSpPr>
-        <p:spPr bwMode="ltGray">
-          <a:xfrm>
-            <a:off x="4730417" y="620688"/>
-            <a:ext cx="4680520" cy="5760640"/>
-          </a:xfrm>
-          <a:prstGeom prst="rect">
-            <a:avLst/>
-          </a:prstGeom>
-        </p:spPr>
-        <p:txBody>
-          <a:bodyPr vert="horz" lIns="91440" tIns="45720" rIns="91440" bIns="45720" rtlCol="0">
-            <a:normAutofit/>
-          </a:bodyPr>
-          <a:lstStyle>
-            <a:lvl1pPr marL="342900" indent="-342900" algn="l" defTabSz="914400" rtl="0" eaLnBrk="1" latinLnBrk="0" hangingPunct="1">
-              <a:lnSpc>
-                <a:spcPct val="100000"/>
-              </a:lnSpc>
-              <a:spcBef>
-                <a:spcPts val="600"/>
-              </a:spcBef>
-              <a:spcAft>
-                <a:spcPts val="600"/>
-              </a:spcAft>
-              <a:buClr>
-                <a:schemeClr val="accent1"/>
-              </a:buClr>
-              <a:buFont typeface="Arial" pitchFamily="34" charset="0"/>
-              <a:buChar char="•"/>
-              <a:defRPr sz="2800" b="1" kern="1200">
-                <a:solidFill>
-                  <a:srgbClr val="393939"/>
-                </a:solidFill>
-                <a:latin typeface="微軟正黑體" pitchFamily="34" charset="-120"/>
-                <a:ea typeface="微軟正黑體" pitchFamily="34" charset="-120"/>
-                <a:cs typeface="+mn-cs"/>
-              </a:defRPr>
-            </a:lvl1pPr>
-            <a:lvl2pPr marL="714375" indent="-352425" algn="l" defTabSz="914400" rtl="0" eaLnBrk="1" latinLnBrk="0" hangingPunct="1">
-              <a:lnSpc>
-                <a:spcPct val="100000"/>
-              </a:lnSpc>
-              <a:spcBef>
-                <a:spcPts val="600"/>
-              </a:spcBef>
-              <a:spcAft>
-                <a:spcPts val="600"/>
-              </a:spcAft>
-              <a:buClr>
-                <a:schemeClr val="accent2"/>
-              </a:buClr>
-              <a:buFont typeface="Arial" pitchFamily="34" charset="0"/>
-              <a:buChar char="–"/>
-              <a:defRPr sz="2400" b="1" kern="1200">
-                <a:solidFill>
-                  <a:srgbClr val="393939"/>
-                </a:solidFill>
-                <a:latin typeface="微軟正黑體" pitchFamily="34" charset="-120"/>
-                <a:ea typeface="微軟正黑體" pitchFamily="34" charset="-120"/>
-                <a:cs typeface="+mn-cs"/>
-              </a:defRPr>
-            </a:lvl2pPr>
-            <a:lvl3pPr marL="1076325" indent="-266700" algn="l" defTabSz="914400" rtl="0" eaLnBrk="1" latinLnBrk="0" hangingPunct="1">
-              <a:lnSpc>
-                <a:spcPct val="100000"/>
-              </a:lnSpc>
-              <a:spcBef>
-                <a:spcPts val="600"/>
-              </a:spcBef>
-              <a:spcAft>
-                <a:spcPts val="600"/>
-              </a:spcAft>
-              <a:buClr>
-                <a:schemeClr val="accent3"/>
-              </a:buClr>
-              <a:buFont typeface="Arial" pitchFamily="34" charset="0"/>
-              <a:buChar char="•"/>
-              <a:defRPr sz="2000" kern="1200">
-                <a:solidFill>
-                  <a:srgbClr val="393939"/>
-                </a:solidFill>
-                <a:latin typeface="微軟正黑體" pitchFamily="34" charset="-120"/>
-                <a:ea typeface="微軟正黑體" pitchFamily="34" charset="-120"/>
-                <a:cs typeface="+mn-cs"/>
-              </a:defRPr>
-            </a:lvl3pPr>
-            <a:lvl4pPr marL="1343025" indent="-180975" algn="l" defTabSz="914400" rtl="0" eaLnBrk="1" latinLnBrk="0" hangingPunct="1">
-              <a:lnSpc>
-                <a:spcPct val="100000"/>
-              </a:lnSpc>
-              <a:spcBef>
-                <a:spcPts val="600"/>
-              </a:spcBef>
-              <a:spcAft>
-                <a:spcPts val="600"/>
-              </a:spcAft>
-              <a:buClr>
-                <a:schemeClr val="accent4"/>
-              </a:buClr>
-              <a:buFont typeface="Arial" pitchFamily="34" charset="0"/>
-              <a:buChar char="–"/>
-              <a:defRPr sz="1800" kern="1200">
-                <a:solidFill>
-                  <a:srgbClr val="393939"/>
-                </a:solidFill>
-                <a:latin typeface="微軟正黑體" pitchFamily="34" charset="-120"/>
-                <a:ea typeface="微軟正黑體" pitchFamily="34" charset="-120"/>
-                <a:cs typeface="+mn-cs"/>
-              </a:defRPr>
-            </a:lvl4pPr>
-            <a:lvl5pPr marL="1619250" indent="-276225" algn="l" defTabSz="914400" rtl="0" eaLnBrk="1" latinLnBrk="0" hangingPunct="1">
-              <a:lnSpc>
-                <a:spcPct val="100000"/>
-              </a:lnSpc>
-              <a:spcBef>
-                <a:spcPts val="600"/>
-              </a:spcBef>
-              <a:spcAft>
-                <a:spcPts val="600"/>
-              </a:spcAft>
-              <a:buClr>
-                <a:schemeClr val="accent5"/>
-              </a:buClr>
-              <a:buFont typeface="Arial" pitchFamily="34" charset="0"/>
-              <a:buChar char="»"/>
-              <a:tabLst>
-                <a:tab pos="7981950" algn="l"/>
-              </a:tabLst>
-              <a:defRPr sz="1800" kern="1200">
-                <a:solidFill>
-                  <a:srgbClr val="393939"/>
-                </a:solidFill>
-                <a:latin typeface="微軟正黑體" pitchFamily="34" charset="-120"/>
-                <a:ea typeface="微軟正黑體" pitchFamily="34" charset="-120"/>
-                <a:cs typeface="+mn-cs"/>
-              </a:defRPr>
-            </a:lvl5pPr>
-            <a:lvl6pPr marL="2514600" indent="-228600" algn="l" defTabSz="914400" rtl="0" eaLnBrk="1" latinLnBrk="0" hangingPunct="1">
-              <a:spcBef>
-                <a:spcPct val="20000"/>
-              </a:spcBef>
-              <a:buFont typeface="Arial" pitchFamily="34" charset="0"/>
-              <a:buChar char="•"/>
-              <a:defRPr sz="2000" kern="1200">
-                <a:solidFill>
-                  <a:schemeClr val="tx1"/>
-                </a:solidFill>
-                <a:latin typeface="+mn-lt"/>
-                <a:ea typeface="+mn-ea"/>
-                <a:cs typeface="+mn-cs"/>
-              </a:defRPr>
-            </a:lvl6pPr>
-            <a:lvl7pPr marL="2971800" indent="-228600" algn="l" defTabSz="914400" rtl="0" eaLnBrk="1" latinLnBrk="0" hangingPunct="1">
-              <a:spcBef>
-                <a:spcPct val="20000"/>
-              </a:spcBef>
-              <a:buFont typeface="Arial" pitchFamily="34" charset="0"/>
-              <a:buChar char="•"/>
-              <a:defRPr sz="2000" kern="1200">
-                <a:solidFill>
-                  <a:schemeClr val="tx1"/>
-                </a:solidFill>
-                <a:latin typeface="+mn-lt"/>
-                <a:ea typeface="+mn-ea"/>
-                <a:cs typeface="+mn-cs"/>
-              </a:defRPr>
-            </a:lvl7pPr>
-            <a:lvl8pPr marL="3429000" indent="-228600" algn="l" defTabSz="914400" rtl="0" eaLnBrk="1" latinLnBrk="0" hangingPunct="1">
-              <a:spcBef>
-                <a:spcPct val="20000"/>
-              </a:spcBef>
-              <a:buFont typeface="Arial" pitchFamily="34" charset="0"/>
-              <a:buChar char="•"/>
-              <a:defRPr sz="2000" kern="1200">
-                <a:solidFill>
-                  <a:schemeClr val="tx1"/>
-                </a:solidFill>
-                <a:latin typeface="+mn-lt"/>
-                <a:ea typeface="+mn-ea"/>
-                <a:cs typeface="+mn-cs"/>
-              </a:defRPr>
-            </a:lvl8pPr>
-            <a:lvl9pPr marL="3886200" indent="-228600" algn="l" defTabSz="914400" rtl="0" eaLnBrk="1" latinLnBrk="0" hangingPunct="1">
-              <a:spcBef>
-                <a:spcPct val="20000"/>
-              </a:spcBef>
-              <a:buFont typeface="Arial" pitchFamily="34" charset="0"/>
-              <a:buChar char="•"/>
-              <a:defRPr sz="2000" kern="1200">
-                <a:solidFill>
-                  <a:schemeClr val="tx1"/>
-                </a:solidFill>
-                <a:latin typeface="+mn-lt"/>
-                <a:ea typeface="+mn-ea"/>
-                <a:cs typeface="+mn-cs"/>
-              </a:defRPr>
-            </a:lvl9pPr>
-          </a:lstStyle>
-          <a:p>
-            <a:r>
-              <a:rPr lang="en-US" dirty="0"/>
-              <a:t>Access Software: </a:t>
-            </a:r>
-          </a:p>
-          <a:p>
-            <a:pPr lvl="1"/>
-            <a:r>
-              <a:rPr lang="en-US" b="0" dirty="0"/>
-              <a:t>Desktop App</a:t>
-            </a:r>
-          </a:p>
-          <a:p>
-            <a:pPr lvl="1"/>
-            <a:r>
-              <a:rPr lang="en-US" b="0" dirty="0"/>
-              <a:t>Website</a:t>
-            </a:r>
-          </a:p>
-          <a:p>
-            <a:pPr lvl="1"/>
-            <a:r>
-              <a:rPr lang="en-US" b="0" dirty="0"/>
-              <a:t>Docker Container</a:t>
-            </a:r>
-          </a:p>
-          <a:p>
-            <a:pPr lvl="1"/>
-            <a:r>
-              <a:rPr lang="en-US" b="0" dirty="0"/>
-              <a:t>Smart Phone App</a:t>
-            </a:r>
-            <a:endParaRPr lang="en-US" dirty="0"/>
-          </a:p>
-          <a:p>
-            <a:r>
-              <a:rPr lang="en-US" dirty="0"/>
-              <a:t>System:</a:t>
-            </a:r>
-          </a:p>
-          <a:p>
-            <a:pPr lvl="1"/>
-            <a:r>
-              <a:rPr lang="en-US" b="0" dirty="0"/>
-              <a:t>Windows</a:t>
-            </a:r>
-          </a:p>
-          <a:p>
-            <a:pPr lvl="1"/>
-            <a:r>
-              <a:rPr lang="en-US" b="0" dirty="0"/>
-              <a:t>Ubuntu</a:t>
-            </a:r>
-          </a:p>
-          <a:p>
-            <a:pPr lvl="1"/>
-            <a:r>
-              <a:rPr lang="en-US" b="0" dirty="0"/>
-              <a:t>Centos</a:t>
+              <a:t>Model Building</a:t>
             </a:r>
           </a:p>
         </p:txBody>
@@ -8963,7 +9760,7 @@
     </p:spTree>
     <p:extLst>
       <p:ext uri="{BB962C8B-B14F-4D97-AF65-F5344CB8AC3E}">
-        <p14:creationId xmlns:p14="http://schemas.microsoft.com/office/powerpoint/2010/main" val="4238824339"/>
+        <p14:creationId xmlns:p14="http://schemas.microsoft.com/office/powerpoint/2010/main" val="1869225185"/>
       </p:ext>
     </p:extLst>
   </p:cSld>
@@ -8992,112 +9789,179 @@
       </p:grpSpPr>
       <p:sp>
         <p:nvSpPr>
-          <p:cNvPr id="2" name="文字方塊 1"/>
-          <p:cNvSpPr txBox="1"/>
-          <p:nvPr/>
-        </p:nvSpPr>
-        <p:spPr>
-          <a:xfrm>
-            <a:off x="3512840" y="2996952"/>
-            <a:ext cx="2880320" cy="720080"/>
-          </a:xfrm>
-          <a:prstGeom prst="rect">
-            <a:avLst/>
-          </a:prstGeom>
-          <a:noFill/>
-        </p:spPr>
-        <p:txBody>
-          <a:bodyPr wrap="square" rtlCol="0">
-            <a:spAutoFit/>
+          <p:cNvPr id="2" name="內容版面配置區 1">
+            <a:extLst>
+              <a:ext uri="{FF2B5EF4-FFF2-40B4-BE49-F238E27FC236}">
+                <a16:creationId xmlns:a16="http://schemas.microsoft.com/office/drawing/2014/main" id="{D7776256-E407-4CB9-8746-467118CF0D41}"/>
+              </a:ext>
+            </a:extLst>
+          </p:cNvPr>
+          <p:cNvSpPr>
+            <a:spLocks noGrp="1"/>
+          </p:cNvSpPr>
+          <p:nvPr>
+            <p:ph idx="1"/>
+          </p:nvPr>
+        </p:nvSpPr>
+        <p:spPr/>
+        <p:txBody>
+          <a:bodyPr>
+            <a:normAutofit lnSpcReduction="10000"/>
           </a:bodyPr>
           <a:lstStyle/>
           <a:p>
             <a:r>
-              <a:rPr lang="en-US" altLang="zh-TW" sz="4000" dirty="0">
-                <a:solidFill>
-                  <a:schemeClr val="accent1"/>
+              <a:rPr lang="en-US" dirty="0"/>
+              <a:t>Random Forest:</a:t>
+            </a:r>
+          </a:p>
+          <a:p>
+            <a:pPr lvl="1"/>
+            <a:r>
+              <a:rPr lang="en-US" dirty="0"/>
+              <a:t>Learning Rate</a:t>
+            </a:r>
+          </a:p>
+          <a:p>
+            <a:pPr lvl="1"/>
+            <a:r>
+              <a:rPr lang="en-US" dirty="0"/>
+              <a:t>Objective Function</a:t>
+            </a:r>
+          </a:p>
+          <a:p>
+            <a:pPr lvl="1"/>
+            <a:r>
+              <a:rPr lang="en-US" dirty="0"/>
+              <a:t>Max </a:t>
+            </a:r>
+            <a:r>
+              <a:rPr lang="en-US" altLang="zh-TW" dirty="0"/>
+              <a:t>D</a:t>
+            </a:r>
+            <a:r>
+              <a:rPr lang="en-US" dirty="0"/>
+              <a:t>epth</a:t>
+            </a:r>
+          </a:p>
+          <a:p>
+            <a:pPr lvl="1"/>
+            <a:r>
+              <a:rPr lang="en-US" dirty="0"/>
+              <a:t>…</a:t>
+            </a:r>
+          </a:p>
+          <a:p>
+            <a:r>
+              <a:rPr lang="en-US" dirty="0"/>
+              <a:t>Deep Learning:</a:t>
+            </a:r>
+          </a:p>
+          <a:p>
+            <a:pPr lvl="1"/>
+            <a:r>
+              <a:rPr lang="en-US" dirty="0"/>
+              <a:t>Learning Rate</a:t>
+            </a:r>
+          </a:p>
+          <a:p>
+            <a:pPr lvl="1"/>
+            <a:r>
+              <a:rPr lang="en-US" dirty="0"/>
+              <a:t>Loss Function</a:t>
+            </a:r>
+          </a:p>
+          <a:p>
+            <a:pPr lvl="1"/>
+            <a:r>
+              <a:rPr lang="en-US" dirty="0"/>
+              <a:t>Optimizer</a:t>
+            </a:r>
+          </a:p>
+          <a:p>
+            <a:pPr lvl="1"/>
+            <a:r>
+              <a:rPr lang="en-US" dirty="0" err="1"/>
+              <a:t>Iterrations</a:t>
+            </a:r>
+            <a:endParaRPr lang="en-US" dirty="0"/>
+          </a:p>
+          <a:p>
+            <a:pPr lvl="1"/>
+            <a:r>
+              <a:rPr lang="en-US" dirty="0"/>
+              <a:t>…</a:t>
+            </a:r>
+          </a:p>
+        </p:txBody>
+      </p:sp>
+      <p:sp>
+        <p:nvSpPr>
+          <p:cNvPr id="3" name="投影片編號版面配置區 2">
+            <a:extLst>
+              <a:ext uri="{FF2B5EF4-FFF2-40B4-BE49-F238E27FC236}">
+                <a16:creationId xmlns:a16="http://schemas.microsoft.com/office/drawing/2014/main" id="{928E6B69-8259-4276-ACC3-1F1CEFA4606A}"/>
+              </a:ext>
+            </a:extLst>
+          </p:cNvPr>
+          <p:cNvSpPr>
+            <a:spLocks noGrp="1"/>
+          </p:cNvSpPr>
+          <p:nvPr>
+            <p:ph type="sldNum" sz="quarter" idx="12"/>
+          </p:nvPr>
+        </p:nvSpPr>
+        <p:spPr/>
+        <p:txBody>
+          <a:bodyPr/>
+          <a:lstStyle/>
+          <a:p>
+            <a:fld id="{8F4EACC7-37E3-43A5-A5FB-BEB9CE95D266}" type="slidenum">
+              <a:rPr lang="zh-TW" altLang="en-US" smtClean="0"/>
+              <a:pPr/>
+              <a:t>18</a:t>
+            </a:fld>
+            <a:endParaRPr lang="zh-TW" altLang="en-US"/>
+          </a:p>
+        </p:txBody>
+      </p:sp>
+      <p:sp>
+        <p:nvSpPr>
+          <p:cNvPr id="4" name="標題 3">
+            <a:extLst>
+              <a:ext uri="{FF2B5EF4-FFF2-40B4-BE49-F238E27FC236}">
+                <a16:creationId xmlns:a16="http://schemas.microsoft.com/office/drawing/2014/main" id="{AB7013AE-5B56-4D15-88A6-1B71BA79B180}"/>
+              </a:ext>
+            </a:extLst>
+          </p:cNvPr>
+          <p:cNvSpPr>
+            <a:spLocks noGrp="1"/>
+          </p:cNvSpPr>
+          <p:nvPr>
+            <p:ph type="title"/>
+          </p:nvPr>
+        </p:nvSpPr>
+        <p:spPr/>
+        <p:txBody>
+          <a:bodyPr/>
+          <a:lstStyle/>
+          <a:p>
+            <a:r>
+              <a:rPr lang="en-US" altLang="zh-TW" dirty="0">
+                <a:solidFill>
+                  <a:schemeClr val="bg1"/>
                 </a:solidFill>
               </a:rPr>
-              <a:t>T</a:t>
-            </a:r>
-            <a:r>
-              <a:rPr lang="en-US" altLang="zh-TW" sz="4000" dirty="0">
-                <a:solidFill>
-                  <a:schemeClr val="accent2"/>
-                </a:solidFill>
-              </a:rPr>
-              <a:t>h</a:t>
-            </a:r>
-            <a:r>
-              <a:rPr lang="en-US" altLang="zh-TW" sz="4000" dirty="0">
-                <a:solidFill>
-                  <a:schemeClr val="accent3"/>
-                </a:solidFill>
-              </a:rPr>
-              <a:t>a</a:t>
-            </a:r>
-            <a:r>
-              <a:rPr lang="en-US" altLang="zh-TW" sz="4000" dirty="0">
-                <a:solidFill>
-                  <a:schemeClr val="accent4"/>
-                </a:solidFill>
-              </a:rPr>
-              <a:t>n</a:t>
-            </a:r>
-            <a:r>
-              <a:rPr lang="en-US" altLang="zh-TW" sz="4000" dirty="0">
-                <a:solidFill>
-                  <a:schemeClr val="accent5"/>
-                </a:solidFill>
-              </a:rPr>
-              <a:t>k</a:t>
-            </a:r>
-            <a:r>
-              <a:rPr lang="en-US" altLang="zh-TW" sz="4000" dirty="0">
-                <a:solidFill>
-                  <a:schemeClr val="tx1">
-                    <a:lumMod val="75000"/>
-                  </a:schemeClr>
-                </a:solidFill>
-              </a:rPr>
-              <a:t> </a:t>
-            </a:r>
-            <a:r>
-              <a:rPr lang="en-US" altLang="zh-TW" sz="4000" dirty="0">
-                <a:solidFill>
-                  <a:schemeClr val="accent6"/>
-                </a:solidFill>
-              </a:rPr>
-              <a:t>y</a:t>
-            </a:r>
-            <a:r>
-              <a:rPr lang="en-US" altLang="zh-TW" sz="4000" dirty="0">
-                <a:solidFill>
-                  <a:schemeClr val="accent1"/>
-                </a:solidFill>
-              </a:rPr>
-              <a:t>o</a:t>
-            </a:r>
-            <a:r>
-              <a:rPr lang="en-US" altLang="zh-TW" sz="4000" dirty="0">
-                <a:solidFill>
-                  <a:schemeClr val="accent3"/>
-                </a:solidFill>
-              </a:rPr>
-              <a:t>u</a:t>
-            </a:r>
-            <a:endParaRPr lang="zh-TW" altLang="en-US" sz="4000" dirty="0" err="1">
-              <a:solidFill>
-                <a:schemeClr val="accent3"/>
-              </a:solidFill>
-            </a:endParaRPr>
+              <a:t>Parameter Tuning</a:t>
+            </a:r>
+            <a:endParaRPr lang="en-US" dirty="0"/>
           </a:p>
         </p:txBody>
       </p:sp>
     </p:spTree>
     <p:extLst>
       <p:ext uri="{BB962C8B-B14F-4D97-AF65-F5344CB8AC3E}">
-        <p14:creationId xmlns:p14="http://schemas.microsoft.com/office/powerpoint/2010/main" val="4034723819"/>
+        <p14:creationId xmlns:p14="http://schemas.microsoft.com/office/powerpoint/2010/main" val="3601684888"/>
       </p:ext>
     </p:extLst>
   </p:cSld>
@@ -9518,6 +10382,747 @@
     <p:extLst>
       <p:ext uri="{BB962C8B-B14F-4D97-AF65-F5344CB8AC3E}">
         <p14:creationId xmlns:p14="http://schemas.microsoft.com/office/powerpoint/2010/main" val="1113325208"/>
+      </p:ext>
+    </p:extLst>
+  </p:cSld>
+  <p:clrMapOvr>
+    <a:masterClrMapping/>
+  </p:clrMapOvr>
+</p:sld>
+</file>
+
+<file path=ppt/slides/slide20.xml><?xml version="1.0" encoding="utf-8"?>
+<p:sld xmlns:a="http://schemas.openxmlformats.org/drawingml/2006/main" xmlns:r="http://schemas.openxmlformats.org/officeDocument/2006/relationships" xmlns:p="http://schemas.openxmlformats.org/presentationml/2006/main">
+  <p:cSld>
+    <p:spTree>
+      <p:nvGrpSpPr>
+        <p:cNvPr id="1" name=""/>
+        <p:cNvGrpSpPr/>
+        <p:nvPr/>
+      </p:nvGrpSpPr>
+      <p:grpSpPr>
+        <a:xfrm>
+          <a:off x="0" y="0"/>
+          <a:ext cx="0" cy="0"/>
+          <a:chOff x="0" y="0"/>
+          <a:chExt cx="0" cy="0"/>
+        </a:xfrm>
+      </p:grpSpPr>
+      <p:sp>
+        <p:nvSpPr>
+          <p:cNvPr id="3" name="投影片編號版面配置區 2">
+            <a:extLst>
+              <a:ext uri="{FF2B5EF4-FFF2-40B4-BE49-F238E27FC236}">
+                <a16:creationId xmlns:a16="http://schemas.microsoft.com/office/drawing/2014/main" id="{EEB00B6B-188B-4BDF-B3E3-0671D2CC1B1C}"/>
+              </a:ext>
+            </a:extLst>
+          </p:cNvPr>
+          <p:cNvSpPr>
+            <a:spLocks noGrp="1"/>
+          </p:cNvSpPr>
+          <p:nvPr>
+            <p:ph type="sldNum" sz="quarter" idx="12"/>
+          </p:nvPr>
+        </p:nvSpPr>
+        <p:spPr/>
+        <p:txBody>
+          <a:bodyPr/>
+          <a:lstStyle/>
+          <a:p>
+            <a:fld id="{8F4EACC7-37E3-43A5-A5FB-BEB9CE95D266}" type="slidenum">
+              <a:rPr lang="zh-TW" altLang="en-US" smtClean="0"/>
+              <a:pPr/>
+              <a:t>19</a:t>
+            </a:fld>
+            <a:endParaRPr lang="zh-TW" altLang="en-US"/>
+          </a:p>
+        </p:txBody>
+      </p:sp>
+      <p:sp>
+        <p:nvSpPr>
+          <p:cNvPr id="4" name="標題 3">
+            <a:extLst>
+              <a:ext uri="{FF2B5EF4-FFF2-40B4-BE49-F238E27FC236}">
+                <a16:creationId xmlns:a16="http://schemas.microsoft.com/office/drawing/2014/main" id="{27FD7A23-8A6D-442D-8FFD-D24D5E6CF3D3}"/>
+              </a:ext>
+            </a:extLst>
+          </p:cNvPr>
+          <p:cNvSpPr>
+            <a:spLocks noGrp="1"/>
+          </p:cNvSpPr>
+          <p:nvPr>
+            <p:ph type="title"/>
+          </p:nvPr>
+        </p:nvSpPr>
+        <p:spPr/>
+        <p:txBody>
+          <a:bodyPr/>
+          <a:lstStyle/>
+          <a:p>
+            <a:r>
+              <a:rPr lang="en-US" altLang="zh-TW" dirty="0">
+                <a:solidFill>
+                  <a:schemeClr val="bg1"/>
+                </a:solidFill>
+              </a:rPr>
+              <a:t>Parameter Tuning – Grid Search</a:t>
+            </a:r>
+            <a:endParaRPr lang="zh-TW" altLang="en-US" dirty="0"/>
+          </a:p>
+        </p:txBody>
+      </p:sp>
+      <p:pic>
+        <p:nvPicPr>
+          <p:cNvPr id="1026" name="Picture 2" descr="Using 3D visualizations to tune hyperparameters in ML models">
+            <a:extLst>
+              <a:ext uri="{FF2B5EF4-FFF2-40B4-BE49-F238E27FC236}">
+                <a16:creationId xmlns:a16="http://schemas.microsoft.com/office/drawing/2014/main" id="{DDE0BFE2-DDBC-4E83-9299-A2640FF73FAD}"/>
+              </a:ext>
+            </a:extLst>
+          </p:cNvPr>
+          <p:cNvPicPr>
+            <a:picLocks noChangeAspect="1" noChangeArrowheads="1"/>
+          </p:cNvPicPr>
+          <p:nvPr/>
+        </p:nvPicPr>
+        <p:blipFill>
+          <a:blip r:embed="rId2">
+            <a:extLst>
+              <a:ext uri="{28A0092B-C50C-407E-A947-70E740481C1C}">
+                <a14:useLocalDpi xmlns:a14="http://schemas.microsoft.com/office/drawing/2010/main" val="0"/>
+              </a:ext>
+            </a:extLst>
+          </a:blip>
+          <a:srcRect/>
+          <a:stretch>
+            <a:fillRect/>
+          </a:stretch>
+        </p:blipFill>
+        <p:spPr bwMode="auto">
+          <a:xfrm>
+            <a:off x="1475229" y="914400"/>
+            <a:ext cx="7387590" cy="5276850"/>
+          </a:xfrm>
+          <a:prstGeom prst="rect">
+            <a:avLst/>
+          </a:prstGeom>
+          <a:noFill/>
+          <a:extLst>
+            <a:ext uri="{909E8E84-426E-40DD-AFC4-6F175D3DCCD1}">
+              <a14:hiddenFill xmlns:a14="http://schemas.microsoft.com/office/drawing/2010/main">
+                <a:solidFill>
+                  <a:srgbClr val="FFFFFF"/>
+                </a:solidFill>
+              </a14:hiddenFill>
+            </a:ext>
+          </a:extLst>
+        </p:spPr>
+      </p:pic>
+    </p:spTree>
+    <p:extLst>
+      <p:ext uri="{BB962C8B-B14F-4D97-AF65-F5344CB8AC3E}">
+        <p14:creationId xmlns:p14="http://schemas.microsoft.com/office/powerpoint/2010/main" val="108491267"/>
+      </p:ext>
+    </p:extLst>
+  </p:cSld>
+  <p:clrMapOvr>
+    <a:masterClrMapping/>
+  </p:clrMapOvr>
+</p:sld>
+</file>
+
+<file path=ppt/slides/slide21.xml><?xml version="1.0" encoding="utf-8"?>
+<p:sld xmlns:a="http://schemas.openxmlformats.org/drawingml/2006/main" xmlns:r="http://schemas.openxmlformats.org/officeDocument/2006/relationships" xmlns:p="http://schemas.openxmlformats.org/presentationml/2006/main">
+  <p:cSld>
+    <p:spTree>
+      <p:nvGrpSpPr>
+        <p:cNvPr id="1" name=""/>
+        <p:cNvGrpSpPr/>
+        <p:nvPr/>
+      </p:nvGrpSpPr>
+      <p:grpSpPr>
+        <a:xfrm>
+          <a:off x="0" y="0"/>
+          <a:ext cx="0" cy="0"/>
+          <a:chOff x="0" y="0"/>
+          <a:chExt cx="0" cy="0"/>
+        </a:xfrm>
+      </p:grpSpPr>
+      <p:sp>
+        <p:nvSpPr>
+          <p:cNvPr id="2" name="內容版面配置區 1">
+            <a:extLst>
+              <a:ext uri="{FF2B5EF4-FFF2-40B4-BE49-F238E27FC236}">
+                <a16:creationId xmlns:a16="http://schemas.microsoft.com/office/drawing/2014/main" id="{4D308327-A129-48EE-94EF-6B74666B2744}"/>
+              </a:ext>
+            </a:extLst>
+          </p:cNvPr>
+          <p:cNvSpPr>
+            <a:spLocks noGrp="1"/>
+          </p:cNvSpPr>
+          <p:nvPr>
+            <p:ph idx="1"/>
+          </p:nvPr>
+        </p:nvSpPr>
+        <p:spPr>
+          <a:xfrm>
+            <a:off x="272480" y="764704"/>
+            <a:ext cx="4680520" cy="5616624"/>
+          </a:xfrm>
+        </p:spPr>
+        <p:txBody>
+          <a:bodyPr>
+            <a:normAutofit/>
+          </a:bodyPr>
+          <a:lstStyle/>
+          <a:p>
+            <a:r>
+              <a:rPr lang="en-US" altLang="zh-TW" dirty="0"/>
+              <a:t>Specification: </a:t>
+            </a:r>
+          </a:p>
+          <a:p>
+            <a:pPr lvl="1"/>
+            <a:r>
+              <a:rPr lang="en-US" altLang="zh-TW" b="0" dirty="0"/>
+              <a:t>CPU</a:t>
+            </a:r>
+          </a:p>
+          <a:p>
+            <a:pPr lvl="1"/>
+            <a:r>
+              <a:rPr lang="en-US" altLang="zh-TW" b="0" dirty="0"/>
+              <a:t>GPU</a:t>
+            </a:r>
+          </a:p>
+          <a:p>
+            <a:pPr lvl="1"/>
+            <a:r>
+              <a:rPr lang="en-US" altLang="zh-TW" b="0" dirty="0"/>
+              <a:t>Memory</a:t>
+            </a:r>
+          </a:p>
+          <a:p>
+            <a:r>
+              <a:rPr lang="en-US" altLang="zh-TW" dirty="0"/>
+              <a:t>Device: </a:t>
+            </a:r>
+          </a:p>
+          <a:p>
+            <a:pPr lvl="1"/>
+            <a:r>
+              <a:rPr lang="en-US" altLang="zh-TW" b="0" dirty="0"/>
+              <a:t>Computer</a:t>
+            </a:r>
+          </a:p>
+          <a:p>
+            <a:pPr lvl="1"/>
+            <a:r>
+              <a:rPr lang="en-US" altLang="zh-TW" b="0" dirty="0"/>
+              <a:t>Smart Phone</a:t>
+            </a:r>
+          </a:p>
+          <a:p>
+            <a:pPr lvl="1"/>
+            <a:r>
+              <a:rPr lang="en-US" b="0" dirty="0"/>
+              <a:t>Development Board (</a:t>
+            </a:r>
+            <a:r>
+              <a:rPr lang="en-US" b="0" dirty="0" err="1"/>
+              <a:t>RaspberryPi</a:t>
+            </a:r>
+            <a:r>
+              <a:rPr lang="en-US" b="0" dirty="0"/>
+              <a:t> or </a:t>
+            </a:r>
+            <a:r>
+              <a:rPr lang="en-US" b="0" dirty="0" err="1"/>
+              <a:t>JetsonNano</a:t>
+            </a:r>
+            <a:r>
+              <a:rPr lang="en-US" b="0" dirty="0"/>
+              <a:t>)</a:t>
+            </a:r>
+          </a:p>
+        </p:txBody>
+      </p:sp>
+      <p:sp>
+        <p:nvSpPr>
+          <p:cNvPr id="3" name="投影片編號版面配置區 2">
+            <a:extLst>
+              <a:ext uri="{FF2B5EF4-FFF2-40B4-BE49-F238E27FC236}">
+                <a16:creationId xmlns:a16="http://schemas.microsoft.com/office/drawing/2014/main" id="{82ED3DEA-7008-450C-815A-CD20FE52C48E}"/>
+              </a:ext>
+            </a:extLst>
+          </p:cNvPr>
+          <p:cNvSpPr>
+            <a:spLocks noGrp="1"/>
+          </p:cNvSpPr>
+          <p:nvPr>
+            <p:ph type="sldNum" sz="quarter" idx="12"/>
+          </p:nvPr>
+        </p:nvSpPr>
+        <p:spPr/>
+        <p:txBody>
+          <a:bodyPr/>
+          <a:lstStyle/>
+          <a:p>
+            <a:fld id="{8F4EACC7-37E3-43A5-A5FB-BEB9CE95D266}" type="slidenum">
+              <a:rPr lang="zh-TW" altLang="en-US" smtClean="0"/>
+              <a:pPr/>
+              <a:t>20</a:t>
+            </a:fld>
+            <a:endParaRPr lang="zh-TW" altLang="en-US"/>
+          </a:p>
+        </p:txBody>
+      </p:sp>
+      <p:sp>
+        <p:nvSpPr>
+          <p:cNvPr id="4" name="標題 3">
+            <a:extLst>
+              <a:ext uri="{FF2B5EF4-FFF2-40B4-BE49-F238E27FC236}">
+                <a16:creationId xmlns:a16="http://schemas.microsoft.com/office/drawing/2014/main" id="{1C0CCDEF-5627-4478-B61F-8D82400D252C}"/>
+              </a:ext>
+            </a:extLst>
+          </p:cNvPr>
+          <p:cNvSpPr>
+            <a:spLocks noGrp="1"/>
+          </p:cNvSpPr>
+          <p:nvPr>
+            <p:ph type="title"/>
+          </p:nvPr>
+        </p:nvSpPr>
+        <p:spPr/>
+        <p:txBody>
+          <a:bodyPr/>
+          <a:lstStyle/>
+          <a:p>
+            <a:r>
+              <a:rPr lang="en-US" altLang="zh-TW" dirty="0"/>
+              <a:t>D</a:t>
+            </a:r>
+            <a:r>
+              <a:rPr lang="en-US" dirty="0"/>
+              <a:t>eployment</a:t>
+            </a:r>
+          </a:p>
+        </p:txBody>
+      </p:sp>
+      <p:sp>
+        <p:nvSpPr>
+          <p:cNvPr id="6" name="內容版面配置區 1">
+            <a:extLst>
+              <a:ext uri="{FF2B5EF4-FFF2-40B4-BE49-F238E27FC236}">
+                <a16:creationId xmlns:a16="http://schemas.microsoft.com/office/drawing/2014/main" id="{A08D7970-9E63-4BD5-B0D6-8AD1FED4BB9C}"/>
+              </a:ext>
+            </a:extLst>
+          </p:cNvPr>
+          <p:cNvSpPr txBox="1">
+            <a:spLocks/>
+          </p:cNvSpPr>
+          <p:nvPr/>
+        </p:nvSpPr>
+        <p:spPr bwMode="ltGray">
+          <a:xfrm>
+            <a:off x="4730417" y="620688"/>
+            <a:ext cx="4680520" cy="5760640"/>
+          </a:xfrm>
+          <a:prstGeom prst="rect">
+            <a:avLst/>
+          </a:prstGeom>
+        </p:spPr>
+        <p:txBody>
+          <a:bodyPr vert="horz" lIns="91440" tIns="45720" rIns="91440" bIns="45720" rtlCol="0">
+            <a:normAutofit/>
+          </a:bodyPr>
+          <a:lstStyle>
+            <a:lvl1pPr marL="342900" indent="-342900" algn="l" defTabSz="914400" rtl="0" eaLnBrk="1" latinLnBrk="0" hangingPunct="1">
+              <a:lnSpc>
+                <a:spcPct val="100000"/>
+              </a:lnSpc>
+              <a:spcBef>
+                <a:spcPts val="600"/>
+              </a:spcBef>
+              <a:spcAft>
+                <a:spcPts val="600"/>
+              </a:spcAft>
+              <a:buClr>
+                <a:schemeClr val="accent1"/>
+              </a:buClr>
+              <a:buFont typeface="Arial" pitchFamily="34" charset="0"/>
+              <a:buChar char="•"/>
+              <a:defRPr sz="2800" b="1" kern="1200">
+                <a:solidFill>
+                  <a:srgbClr val="393939"/>
+                </a:solidFill>
+                <a:latin typeface="微軟正黑體" pitchFamily="34" charset="-120"/>
+                <a:ea typeface="微軟正黑體" pitchFamily="34" charset="-120"/>
+                <a:cs typeface="+mn-cs"/>
+              </a:defRPr>
+            </a:lvl1pPr>
+            <a:lvl2pPr marL="714375" indent="-352425" algn="l" defTabSz="914400" rtl="0" eaLnBrk="1" latinLnBrk="0" hangingPunct="1">
+              <a:lnSpc>
+                <a:spcPct val="100000"/>
+              </a:lnSpc>
+              <a:spcBef>
+                <a:spcPts val="600"/>
+              </a:spcBef>
+              <a:spcAft>
+                <a:spcPts val="600"/>
+              </a:spcAft>
+              <a:buClr>
+                <a:schemeClr val="accent2"/>
+              </a:buClr>
+              <a:buFont typeface="Arial" pitchFamily="34" charset="0"/>
+              <a:buChar char="–"/>
+              <a:defRPr sz="2400" b="1" kern="1200">
+                <a:solidFill>
+                  <a:srgbClr val="393939"/>
+                </a:solidFill>
+                <a:latin typeface="微軟正黑體" pitchFamily="34" charset="-120"/>
+                <a:ea typeface="微軟正黑體" pitchFamily="34" charset="-120"/>
+                <a:cs typeface="+mn-cs"/>
+              </a:defRPr>
+            </a:lvl2pPr>
+            <a:lvl3pPr marL="1076325" indent="-266700" algn="l" defTabSz="914400" rtl="0" eaLnBrk="1" latinLnBrk="0" hangingPunct="1">
+              <a:lnSpc>
+                <a:spcPct val="100000"/>
+              </a:lnSpc>
+              <a:spcBef>
+                <a:spcPts val="600"/>
+              </a:spcBef>
+              <a:spcAft>
+                <a:spcPts val="600"/>
+              </a:spcAft>
+              <a:buClr>
+                <a:schemeClr val="accent3"/>
+              </a:buClr>
+              <a:buFont typeface="Arial" pitchFamily="34" charset="0"/>
+              <a:buChar char="•"/>
+              <a:defRPr sz="2000" kern="1200">
+                <a:solidFill>
+                  <a:srgbClr val="393939"/>
+                </a:solidFill>
+                <a:latin typeface="微軟正黑體" pitchFamily="34" charset="-120"/>
+                <a:ea typeface="微軟正黑體" pitchFamily="34" charset="-120"/>
+                <a:cs typeface="+mn-cs"/>
+              </a:defRPr>
+            </a:lvl3pPr>
+            <a:lvl4pPr marL="1343025" indent="-180975" algn="l" defTabSz="914400" rtl="0" eaLnBrk="1" latinLnBrk="0" hangingPunct="1">
+              <a:lnSpc>
+                <a:spcPct val="100000"/>
+              </a:lnSpc>
+              <a:spcBef>
+                <a:spcPts val="600"/>
+              </a:spcBef>
+              <a:spcAft>
+                <a:spcPts val="600"/>
+              </a:spcAft>
+              <a:buClr>
+                <a:schemeClr val="accent4"/>
+              </a:buClr>
+              <a:buFont typeface="Arial" pitchFamily="34" charset="0"/>
+              <a:buChar char="–"/>
+              <a:defRPr sz="1800" kern="1200">
+                <a:solidFill>
+                  <a:srgbClr val="393939"/>
+                </a:solidFill>
+                <a:latin typeface="微軟正黑體" pitchFamily="34" charset="-120"/>
+                <a:ea typeface="微軟正黑體" pitchFamily="34" charset="-120"/>
+                <a:cs typeface="+mn-cs"/>
+              </a:defRPr>
+            </a:lvl4pPr>
+            <a:lvl5pPr marL="1619250" indent="-276225" algn="l" defTabSz="914400" rtl="0" eaLnBrk="1" latinLnBrk="0" hangingPunct="1">
+              <a:lnSpc>
+                <a:spcPct val="100000"/>
+              </a:lnSpc>
+              <a:spcBef>
+                <a:spcPts val="600"/>
+              </a:spcBef>
+              <a:spcAft>
+                <a:spcPts val="600"/>
+              </a:spcAft>
+              <a:buClr>
+                <a:schemeClr val="accent5"/>
+              </a:buClr>
+              <a:buFont typeface="Arial" pitchFamily="34" charset="0"/>
+              <a:buChar char="»"/>
+              <a:tabLst>
+                <a:tab pos="7981950" algn="l"/>
+              </a:tabLst>
+              <a:defRPr sz="1800" kern="1200">
+                <a:solidFill>
+                  <a:srgbClr val="393939"/>
+                </a:solidFill>
+                <a:latin typeface="微軟正黑體" pitchFamily="34" charset="-120"/>
+                <a:ea typeface="微軟正黑體" pitchFamily="34" charset="-120"/>
+                <a:cs typeface="+mn-cs"/>
+              </a:defRPr>
+            </a:lvl5pPr>
+            <a:lvl6pPr marL="2514600" indent="-228600" algn="l" defTabSz="914400" rtl="0" eaLnBrk="1" latinLnBrk="0" hangingPunct="1">
+              <a:spcBef>
+                <a:spcPct val="20000"/>
+              </a:spcBef>
+              <a:buFont typeface="Arial" pitchFamily="34" charset="0"/>
+              <a:buChar char="•"/>
+              <a:defRPr sz="2000" kern="1200">
+                <a:solidFill>
+                  <a:schemeClr val="tx1"/>
+                </a:solidFill>
+                <a:latin typeface="+mn-lt"/>
+                <a:ea typeface="+mn-ea"/>
+                <a:cs typeface="+mn-cs"/>
+              </a:defRPr>
+            </a:lvl6pPr>
+            <a:lvl7pPr marL="2971800" indent="-228600" algn="l" defTabSz="914400" rtl="0" eaLnBrk="1" latinLnBrk="0" hangingPunct="1">
+              <a:spcBef>
+                <a:spcPct val="20000"/>
+              </a:spcBef>
+              <a:buFont typeface="Arial" pitchFamily="34" charset="0"/>
+              <a:buChar char="•"/>
+              <a:defRPr sz="2000" kern="1200">
+                <a:solidFill>
+                  <a:schemeClr val="tx1"/>
+                </a:solidFill>
+                <a:latin typeface="+mn-lt"/>
+                <a:ea typeface="+mn-ea"/>
+                <a:cs typeface="+mn-cs"/>
+              </a:defRPr>
+            </a:lvl7pPr>
+            <a:lvl8pPr marL="3429000" indent="-228600" algn="l" defTabSz="914400" rtl="0" eaLnBrk="1" latinLnBrk="0" hangingPunct="1">
+              <a:spcBef>
+                <a:spcPct val="20000"/>
+              </a:spcBef>
+              <a:buFont typeface="Arial" pitchFamily="34" charset="0"/>
+              <a:buChar char="•"/>
+              <a:defRPr sz="2000" kern="1200">
+                <a:solidFill>
+                  <a:schemeClr val="tx1"/>
+                </a:solidFill>
+                <a:latin typeface="+mn-lt"/>
+                <a:ea typeface="+mn-ea"/>
+                <a:cs typeface="+mn-cs"/>
+              </a:defRPr>
+            </a:lvl8pPr>
+            <a:lvl9pPr marL="3886200" indent="-228600" algn="l" defTabSz="914400" rtl="0" eaLnBrk="1" latinLnBrk="0" hangingPunct="1">
+              <a:spcBef>
+                <a:spcPct val="20000"/>
+              </a:spcBef>
+              <a:buFont typeface="Arial" pitchFamily="34" charset="0"/>
+              <a:buChar char="•"/>
+              <a:defRPr sz="2000" kern="1200">
+                <a:solidFill>
+                  <a:schemeClr val="tx1"/>
+                </a:solidFill>
+                <a:latin typeface="+mn-lt"/>
+                <a:ea typeface="+mn-ea"/>
+                <a:cs typeface="+mn-cs"/>
+              </a:defRPr>
+            </a:lvl9pPr>
+          </a:lstStyle>
+          <a:p>
+            <a:r>
+              <a:rPr lang="en-US" dirty="0"/>
+              <a:t>Access Software: </a:t>
+            </a:r>
+          </a:p>
+          <a:p>
+            <a:pPr lvl="1"/>
+            <a:r>
+              <a:rPr lang="en-US" b="0" dirty="0"/>
+              <a:t>Desktop App</a:t>
+            </a:r>
+          </a:p>
+          <a:p>
+            <a:pPr lvl="1"/>
+            <a:r>
+              <a:rPr lang="en-US" b="0" dirty="0"/>
+              <a:t>Website</a:t>
+            </a:r>
+          </a:p>
+          <a:p>
+            <a:pPr lvl="1"/>
+            <a:r>
+              <a:rPr lang="en-US" b="0" dirty="0"/>
+              <a:t>Docker Container</a:t>
+            </a:r>
+          </a:p>
+          <a:p>
+            <a:pPr lvl="1"/>
+            <a:r>
+              <a:rPr lang="en-US" b="0" dirty="0"/>
+              <a:t>Smart Phone App</a:t>
+            </a:r>
+            <a:endParaRPr lang="en-US" dirty="0"/>
+          </a:p>
+          <a:p>
+            <a:r>
+              <a:rPr lang="en-US" dirty="0"/>
+              <a:t>System:</a:t>
+            </a:r>
+          </a:p>
+          <a:p>
+            <a:pPr lvl="1"/>
+            <a:r>
+              <a:rPr lang="en-US" b="0" dirty="0"/>
+              <a:t>Windows</a:t>
+            </a:r>
+          </a:p>
+          <a:p>
+            <a:pPr lvl="1"/>
+            <a:r>
+              <a:rPr lang="en-US" b="0" dirty="0"/>
+              <a:t>Ubuntu</a:t>
+            </a:r>
+          </a:p>
+          <a:p>
+            <a:pPr lvl="1"/>
+            <a:r>
+              <a:rPr lang="en-US" b="0" dirty="0"/>
+              <a:t>Centos</a:t>
+            </a:r>
+          </a:p>
+        </p:txBody>
+      </p:sp>
+    </p:spTree>
+    <p:extLst>
+      <p:ext uri="{BB962C8B-B14F-4D97-AF65-F5344CB8AC3E}">
+        <p14:creationId xmlns:p14="http://schemas.microsoft.com/office/powerpoint/2010/main" val="4238824339"/>
+      </p:ext>
+    </p:extLst>
+  </p:cSld>
+  <p:clrMapOvr>
+    <a:masterClrMapping/>
+  </p:clrMapOvr>
+</p:sld>
+</file>
+
+<file path=ppt/slides/slide22.xml><?xml version="1.0" encoding="utf-8"?>
+<p:sld xmlns:a="http://schemas.openxmlformats.org/drawingml/2006/main" xmlns:r="http://schemas.openxmlformats.org/officeDocument/2006/relationships" xmlns:p="http://schemas.openxmlformats.org/presentationml/2006/main">
+  <p:cSld>
+    <p:spTree>
+      <p:nvGrpSpPr>
+        <p:cNvPr id="1" name=""/>
+        <p:cNvGrpSpPr/>
+        <p:nvPr/>
+      </p:nvGrpSpPr>
+      <p:grpSpPr>
+        <a:xfrm>
+          <a:off x="0" y="0"/>
+          <a:ext cx="0" cy="0"/>
+          <a:chOff x="0" y="0"/>
+          <a:chExt cx="0" cy="0"/>
+        </a:xfrm>
+      </p:grpSpPr>
+      <p:sp>
+        <p:nvSpPr>
+          <p:cNvPr id="2" name="文字方塊 1"/>
+          <p:cNvSpPr txBox="1"/>
+          <p:nvPr/>
+        </p:nvSpPr>
+        <p:spPr>
+          <a:xfrm>
+            <a:off x="3512840" y="2996952"/>
+            <a:ext cx="2880320" cy="720080"/>
+          </a:xfrm>
+          <a:prstGeom prst="rect">
+            <a:avLst/>
+          </a:prstGeom>
+          <a:noFill/>
+        </p:spPr>
+        <p:txBody>
+          <a:bodyPr wrap="square" rtlCol="0">
+            <a:spAutoFit/>
+          </a:bodyPr>
+          <a:lstStyle/>
+          <a:p>
+            <a:r>
+              <a:rPr lang="en-US" altLang="zh-TW" sz="4000" dirty="0">
+                <a:solidFill>
+                  <a:schemeClr val="accent1"/>
+                </a:solidFill>
+              </a:rPr>
+              <a:t>T</a:t>
+            </a:r>
+            <a:r>
+              <a:rPr lang="en-US" altLang="zh-TW" sz="4000" dirty="0">
+                <a:solidFill>
+                  <a:schemeClr val="accent2"/>
+                </a:solidFill>
+              </a:rPr>
+              <a:t>h</a:t>
+            </a:r>
+            <a:r>
+              <a:rPr lang="en-US" altLang="zh-TW" sz="4000" dirty="0">
+                <a:solidFill>
+                  <a:schemeClr val="accent3"/>
+                </a:solidFill>
+              </a:rPr>
+              <a:t>a</a:t>
+            </a:r>
+            <a:r>
+              <a:rPr lang="en-US" altLang="zh-TW" sz="4000" dirty="0">
+                <a:solidFill>
+                  <a:schemeClr val="accent4"/>
+                </a:solidFill>
+              </a:rPr>
+              <a:t>n</a:t>
+            </a:r>
+            <a:r>
+              <a:rPr lang="en-US" altLang="zh-TW" sz="4000" dirty="0">
+                <a:solidFill>
+                  <a:schemeClr val="accent5"/>
+                </a:solidFill>
+              </a:rPr>
+              <a:t>k</a:t>
+            </a:r>
+            <a:r>
+              <a:rPr lang="en-US" altLang="zh-TW" sz="4000" dirty="0">
+                <a:solidFill>
+                  <a:schemeClr val="tx1">
+                    <a:lumMod val="75000"/>
+                  </a:schemeClr>
+                </a:solidFill>
+              </a:rPr>
+              <a:t> </a:t>
+            </a:r>
+            <a:r>
+              <a:rPr lang="en-US" altLang="zh-TW" sz="4000" dirty="0">
+                <a:solidFill>
+                  <a:schemeClr val="accent6"/>
+                </a:solidFill>
+              </a:rPr>
+              <a:t>y</a:t>
+            </a:r>
+            <a:r>
+              <a:rPr lang="en-US" altLang="zh-TW" sz="4000" dirty="0">
+                <a:solidFill>
+                  <a:schemeClr val="accent1"/>
+                </a:solidFill>
+              </a:rPr>
+              <a:t>o</a:t>
+            </a:r>
+            <a:r>
+              <a:rPr lang="en-US" altLang="zh-TW" sz="4000" dirty="0">
+                <a:solidFill>
+                  <a:schemeClr val="accent3"/>
+                </a:solidFill>
+              </a:rPr>
+              <a:t>u</a:t>
+            </a:r>
+            <a:endParaRPr lang="zh-TW" altLang="en-US" sz="4000" dirty="0" err="1">
+              <a:solidFill>
+                <a:schemeClr val="accent3"/>
+              </a:solidFill>
+            </a:endParaRPr>
+          </a:p>
+        </p:txBody>
+      </p:sp>
+    </p:spTree>
+    <p:extLst>
+      <p:ext uri="{BB962C8B-B14F-4D97-AF65-F5344CB8AC3E}">
+        <p14:creationId xmlns:p14="http://schemas.microsoft.com/office/powerpoint/2010/main" val="4034723819"/>
       </p:ext>
     </p:extLst>
   </p:cSld>

</xml_diff>